<commit_message>
joystick : remove driver.exe, update notice joystick
</commit_message>
<xml_diff>
--- a/joystick/doc/joystick-pygame table de correspondance.pptx
+++ b/joystick/doc/joystick-pygame table de correspondance.pptx
@@ -6,7 +6,9 @@
   </p:sldMasterIdLst>
   <p:sldIdLst>
     <p:sldId id="256" r:id="rId2"/>
-    <p:sldId id="257" r:id="rId3"/>
+    <p:sldId id="258" r:id="rId3"/>
+    <p:sldId id="257" r:id="rId4"/>
+    <p:sldId id="259" r:id="rId5"/>
   </p:sldIdLst>
   <p:sldSz cx="12192000" cy="6858000"/>
   <p:notesSz cx="6858000" cy="9144000"/>
@@ -313,7 +315,7 @@
           <a:p>
             <a:fld id="{5B9CB25E-C2E2-47DF-ADCE-4F12D3779D54}" type="datetimeFigureOut">
               <a:rPr lang="fr-FR" smtClean="0"/>
-              <a:t>29/09/2023</a:t>
+              <a:t>04/03/2024</a:t>
             </a:fld>
             <a:endParaRPr lang="fr-FR"/>
           </a:p>
@@ -511,7 +513,7 @@
           <a:p>
             <a:fld id="{5B9CB25E-C2E2-47DF-ADCE-4F12D3779D54}" type="datetimeFigureOut">
               <a:rPr lang="fr-FR" smtClean="0"/>
-              <a:t>29/09/2023</a:t>
+              <a:t>04/03/2024</a:t>
             </a:fld>
             <a:endParaRPr lang="fr-FR"/>
           </a:p>
@@ -719,7 +721,7 @@
           <a:p>
             <a:fld id="{5B9CB25E-C2E2-47DF-ADCE-4F12D3779D54}" type="datetimeFigureOut">
               <a:rPr lang="fr-FR" smtClean="0"/>
-              <a:t>29/09/2023</a:t>
+              <a:t>04/03/2024</a:t>
             </a:fld>
             <a:endParaRPr lang="fr-FR"/>
           </a:p>
@@ -917,7 +919,7 @@
           <a:p>
             <a:fld id="{5B9CB25E-C2E2-47DF-ADCE-4F12D3779D54}" type="datetimeFigureOut">
               <a:rPr lang="fr-FR" smtClean="0"/>
-              <a:t>29/09/2023</a:t>
+              <a:t>04/03/2024</a:t>
             </a:fld>
             <a:endParaRPr lang="fr-FR"/>
           </a:p>
@@ -1192,7 +1194,7 @@
           <a:p>
             <a:fld id="{5B9CB25E-C2E2-47DF-ADCE-4F12D3779D54}" type="datetimeFigureOut">
               <a:rPr lang="fr-FR" smtClean="0"/>
-              <a:t>29/09/2023</a:t>
+              <a:t>04/03/2024</a:t>
             </a:fld>
             <a:endParaRPr lang="fr-FR"/>
           </a:p>
@@ -1457,7 +1459,7 @@
           <a:p>
             <a:fld id="{5B9CB25E-C2E2-47DF-ADCE-4F12D3779D54}" type="datetimeFigureOut">
               <a:rPr lang="fr-FR" smtClean="0"/>
-              <a:t>29/09/2023</a:t>
+              <a:t>04/03/2024</a:t>
             </a:fld>
             <a:endParaRPr lang="fr-FR"/>
           </a:p>
@@ -1869,7 +1871,7 @@
           <a:p>
             <a:fld id="{5B9CB25E-C2E2-47DF-ADCE-4F12D3779D54}" type="datetimeFigureOut">
               <a:rPr lang="fr-FR" smtClean="0"/>
-              <a:t>29/09/2023</a:t>
+              <a:t>04/03/2024</a:t>
             </a:fld>
             <a:endParaRPr lang="fr-FR"/>
           </a:p>
@@ -2010,7 +2012,7 @@
           <a:p>
             <a:fld id="{5B9CB25E-C2E2-47DF-ADCE-4F12D3779D54}" type="datetimeFigureOut">
               <a:rPr lang="fr-FR" smtClean="0"/>
-              <a:t>29/09/2023</a:t>
+              <a:t>04/03/2024</a:t>
             </a:fld>
             <a:endParaRPr lang="fr-FR"/>
           </a:p>
@@ -2123,7 +2125,7 @@
           <a:p>
             <a:fld id="{5B9CB25E-C2E2-47DF-ADCE-4F12D3779D54}" type="datetimeFigureOut">
               <a:rPr lang="fr-FR" smtClean="0"/>
-              <a:t>29/09/2023</a:t>
+              <a:t>04/03/2024</a:t>
             </a:fld>
             <a:endParaRPr lang="fr-FR"/>
           </a:p>
@@ -2434,7 +2436,7 @@
           <a:p>
             <a:fld id="{5B9CB25E-C2E2-47DF-ADCE-4F12D3779D54}" type="datetimeFigureOut">
               <a:rPr lang="fr-FR" smtClean="0"/>
-              <a:t>29/09/2023</a:t>
+              <a:t>04/03/2024</a:t>
             </a:fld>
             <a:endParaRPr lang="fr-FR"/>
           </a:p>
@@ -2722,7 +2724,7 @@
           <a:p>
             <a:fld id="{5B9CB25E-C2E2-47DF-ADCE-4F12D3779D54}" type="datetimeFigureOut">
               <a:rPr lang="fr-FR" smtClean="0"/>
-              <a:t>29/09/2023</a:t>
+              <a:t>04/03/2024</a:t>
             </a:fld>
             <a:endParaRPr lang="fr-FR"/>
           </a:p>
@@ -2963,7 +2965,7 @@
           <a:p>
             <a:fld id="{5B9CB25E-C2E2-47DF-ADCE-4F12D3779D54}" type="datetimeFigureOut">
               <a:rPr lang="fr-FR" smtClean="0"/>
-              <a:t>29/09/2023</a:t>
+              <a:t>04/03/2024</a:t>
             </a:fld>
             <a:endParaRPr lang="fr-FR"/>
           </a:p>
@@ -6560,6 +6562,1899 @@
   <p:cSld>
     <p:spTree>
       <p:nvGrpSpPr>
+        <p:cNvPr id="1" name="">
+          <a:extLst>
+            <a:ext uri="{FF2B5EF4-FFF2-40B4-BE49-F238E27FC236}">
+              <a16:creationId xmlns:a16="http://schemas.microsoft.com/office/drawing/2014/main" id="{DB6A4ADF-9E79-E877-2C63-8EF0CCEC4C50}"/>
+            </a:ext>
+          </a:extLst>
+        </p:cNvPr>
+        <p:cNvGrpSpPr/>
+        <p:nvPr/>
+      </p:nvGrpSpPr>
+      <p:grpSpPr>
+        <a:xfrm>
+          <a:off x="0" y="0"/>
+          <a:ext cx="0" cy="0"/>
+          <a:chOff x="0" y="0"/>
+          <a:chExt cx="0" cy="0"/>
+        </a:xfrm>
+      </p:grpSpPr>
+      <p:sp>
+        <p:nvSpPr>
+          <p:cNvPr id="4" name="ZoneTexte 3">
+            <a:extLst>
+              <a:ext uri="{FF2B5EF4-FFF2-40B4-BE49-F238E27FC236}">
+                <a16:creationId xmlns:a16="http://schemas.microsoft.com/office/drawing/2014/main" id="{3ED0E632-0B17-E251-9BF6-622BC1159672}"/>
+              </a:ext>
+            </a:extLst>
+          </p:cNvPr>
+          <p:cNvSpPr txBox="1"/>
+          <p:nvPr/>
+        </p:nvSpPr>
+        <p:spPr>
+          <a:xfrm>
+            <a:off x="210258" y="240237"/>
+            <a:ext cx="2707004" cy="523220"/>
+          </a:xfrm>
+          <a:prstGeom prst="rect">
+            <a:avLst/>
+          </a:prstGeom>
+          <a:noFill/>
+        </p:spPr>
+        <p:txBody>
+          <a:bodyPr wrap="square" rtlCol="0">
+            <a:spAutoFit/>
+          </a:bodyPr>
+          <a:lstStyle/>
+          <a:p>
+            <a:r>
+              <a:rPr lang="fr-FR" sz="2800" b="1" dirty="0"/>
+              <a:t>CONFIG GAUCHE</a:t>
+            </a:r>
+          </a:p>
+        </p:txBody>
+      </p:sp>
+      <p:graphicFrame>
+        <p:nvGraphicFramePr>
+          <p:cNvPr id="9" name="Tableau 9">
+            <a:extLst>
+              <a:ext uri="{FF2B5EF4-FFF2-40B4-BE49-F238E27FC236}">
+                <a16:creationId xmlns:a16="http://schemas.microsoft.com/office/drawing/2014/main" id="{D7B315F3-69C0-A9D1-4D1B-03B62DD76A02}"/>
+              </a:ext>
+            </a:extLst>
+          </p:cNvPr>
+          <p:cNvGraphicFramePr>
+            <a:graphicFrameLocks noGrp="1"/>
+          </p:cNvGraphicFramePr>
+          <p:nvPr>
+            <p:extLst>
+              <p:ext uri="{D42A27DB-BD31-4B8C-83A1-F6EECF244321}">
+                <p14:modId xmlns:p14="http://schemas.microsoft.com/office/powerpoint/2010/main" val="3791401898"/>
+              </p:ext>
+            </p:extLst>
+          </p:nvPr>
+        </p:nvGraphicFramePr>
+        <p:xfrm>
+          <a:off x="8051829" y="3836758"/>
+          <a:ext cx="3675117" cy="1101296"/>
+        </p:xfrm>
+        <a:graphic>
+          <a:graphicData uri="http://schemas.openxmlformats.org/drawingml/2006/table">
+            <a:tbl>
+              <a:tblPr firstRow="1" bandRow="1">
+                <a:tableStyleId>{2D5ABB26-0587-4C30-8999-92F81FD0307C}</a:tableStyleId>
+              </a:tblPr>
+              <a:tblGrid>
+                <a:gridCol w="1225039">
+                  <a:extLst>
+                    <a:ext uri="{9D8B030D-6E8A-4147-A177-3AD203B41FA5}">
+                      <a16:colId xmlns:a16="http://schemas.microsoft.com/office/drawing/2014/main" val="1244037658"/>
+                    </a:ext>
+                  </a:extLst>
+                </a:gridCol>
+                <a:gridCol w="1225039">
+                  <a:extLst>
+                    <a:ext uri="{9D8B030D-6E8A-4147-A177-3AD203B41FA5}">
+                      <a16:colId xmlns:a16="http://schemas.microsoft.com/office/drawing/2014/main" val="3908260985"/>
+                    </a:ext>
+                  </a:extLst>
+                </a:gridCol>
+                <a:gridCol w="1225039">
+                  <a:extLst>
+                    <a:ext uri="{9D8B030D-6E8A-4147-A177-3AD203B41FA5}">
+                      <a16:colId xmlns:a16="http://schemas.microsoft.com/office/drawing/2014/main" val="284647492"/>
+                    </a:ext>
+                  </a:extLst>
+                </a:gridCol>
+              </a:tblGrid>
+              <a:tr h="461216">
+                <a:tc>
+                  <a:txBody>
+                    <a:bodyPr/>
+                    <a:lstStyle/>
+                    <a:p>
+                      <a:r>
+                        <a:rPr lang="fr-FR" dirty="0"/>
+                        <a:t>stockage3</a:t>
+                      </a:r>
+                    </a:p>
+                  </a:txBody>
+                  <a:tcPr>
+                    <a:lnL w="12700" cap="flat" cmpd="sng" algn="ctr">
+                      <a:solidFill>
+                        <a:schemeClr val="tx1"/>
+                      </a:solidFill>
+                      <a:prstDash val="solid"/>
+                      <a:round/>
+                      <a:headEnd type="none" w="med" len="med"/>
+                      <a:tailEnd type="none" w="med" len="med"/>
+                    </a:lnL>
+                    <a:lnR w="12700" cap="flat" cmpd="sng" algn="ctr">
+                      <a:solidFill>
+                        <a:schemeClr val="tx1"/>
+                      </a:solidFill>
+                      <a:prstDash val="solid"/>
+                      <a:round/>
+                      <a:headEnd type="none" w="med" len="med"/>
+                      <a:tailEnd type="none" w="med" len="med"/>
+                    </a:lnR>
+                    <a:lnT w="12700" cap="flat" cmpd="sng" algn="ctr">
+                      <a:solidFill>
+                        <a:schemeClr val="tx1"/>
+                      </a:solidFill>
+                      <a:prstDash val="solid"/>
+                      <a:round/>
+                      <a:headEnd type="none" w="med" len="med"/>
+                      <a:tailEnd type="none" w="med" len="med"/>
+                    </a:lnT>
+                    <a:lnB w="12700" cap="flat" cmpd="sng" algn="ctr">
+                      <a:solidFill>
+                        <a:schemeClr val="tx1"/>
+                      </a:solidFill>
+                      <a:prstDash val="solid"/>
+                      <a:round/>
+                      <a:headEnd type="none" w="med" len="med"/>
+                      <a:tailEnd type="none" w="med" len="med"/>
+                    </a:lnB>
+                    <a:cell3D prstMaterial="dkEdge">
+                      <a:bevel/>
+                      <a:lightRig rig="flood" dir="t"/>
+                    </a:cell3D>
+                  </a:tcPr>
+                </a:tc>
+                <a:tc>
+                  <a:txBody>
+                    <a:bodyPr/>
+                    <a:lstStyle/>
+                    <a:p>
+                      <a:r>
+                        <a:rPr lang="fr-FR" dirty="0"/>
+                        <a:t>stockage2</a:t>
+                      </a:r>
+                    </a:p>
+                  </a:txBody>
+                  <a:tcPr>
+                    <a:lnL w="12700" cap="flat" cmpd="sng" algn="ctr">
+                      <a:solidFill>
+                        <a:schemeClr val="tx1"/>
+                      </a:solidFill>
+                      <a:prstDash val="solid"/>
+                      <a:round/>
+                      <a:headEnd type="none" w="med" len="med"/>
+                      <a:tailEnd type="none" w="med" len="med"/>
+                    </a:lnL>
+                    <a:lnR w="12700" cap="flat" cmpd="sng" algn="ctr">
+                      <a:solidFill>
+                        <a:schemeClr val="tx1"/>
+                      </a:solidFill>
+                      <a:prstDash val="solid"/>
+                      <a:round/>
+                      <a:headEnd type="none" w="med" len="med"/>
+                      <a:tailEnd type="none" w="med" len="med"/>
+                    </a:lnR>
+                    <a:lnT w="12700" cap="flat" cmpd="sng" algn="ctr">
+                      <a:solidFill>
+                        <a:schemeClr val="tx1"/>
+                      </a:solidFill>
+                      <a:prstDash val="solid"/>
+                      <a:round/>
+                      <a:headEnd type="none" w="med" len="med"/>
+                      <a:tailEnd type="none" w="med" len="med"/>
+                    </a:lnT>
+                    <a:lnB w="12700" cap="flat" cmpd="sng" algn="ctr">
+                      <a:solidFill>
+                        <a:schemeClr val="tx1"/>
+                      </a:solidFill>
+                      <a:prstDash val="solid"/>
+                      <a:round/>
+                      <a:headEnd type="none" w="med" len="med"/>
+                      <a:tailEnd type="none" w="med" len="med"/>
+                    </a:lnB>
+                    <a:cell3D prstMaterial="dkEdge">
+                      <a:bevel/>
+                      <a:lightRig rig="flood" dir="t"/>
+                    </a:cell3D>
+                  </a:tcPr>
+                </a:tc>
+                <a:tc>
+                  <a:txBody>
+                    <a:bodyPr/>
+                    <a:lstStyle/>
+                    <a:p>
+                      <a:r>
+                        <a:rPr lang="fr-FR" dirty="0"/>
+                        <a:t>stockage1</a:t>
+                      </a:r>
+                    </a:p>
+                  </a:txBody>
+                  <a:tcPr>
+                    <a:lnL w="12700" cap="flat" cmpd="sng" algn="ctr">
+                      <a:solidFill>
+                        <a:schemeClr val="tx1"/>
+                      </a:solidFill>
+                      <a:prstDash val="solid"/>
+                      <a:round/>
+                      <a:headEnd type="none" w="med" len="med"/>
+                      <a:tailEnd type="none" w="med" len="med"/>
+                    </a:lnL>
+                    <a:lnR w="12700" cap="flat" cmpd="sng" algn="ctr">
+                      <a:solidFill>
+                        <a:schemeClr val="tx1"/>
+                      </a:solidFill>
+                      <a:prstDash val="solid"/>
+                      <a:round/>
+                      <a:headEnd type="none" w="med" len="med"/>
+                      <a:tailEnd type="none" w="med" len="med"/>
+                    </a:lnR>
+                    <a:lnT w="12700" cap="flat" cmpd="sng" algn="ctr">
+                      <a:solidFill>
+                        <a:schemeClr val="tx1"/>
+                      </a:solidFill>
+                      <a:prstDash val="solid"/>
+                      <a:round/>
+                      <a:headEnd type="none" w="med" len="med"/>
+                      <a:tailEnd type="none" w="med" len="med"/>
+                    </a:lnT>
+                    <a:lnB w="12700" cap="flat" cmpd="sng" algn="ctr">
+                      <a:solidFill>
+                        <a:schemeClr val="tx1"/>
+                      </a:solidFill>
+                      <a:prstDash val="solid"/>
+                      <a:round/>
+                      <a:headEnd type="none" w="med" len="med"/>
+                      <a:tailEnd type="none" w="med" len="med"/>
+                    </a:lnB>
+                    <a:cell3D prstMaterial="dkEdge">
+                      <a:bevel/>
+                      <a:lightRig rig="flood" dir="t"/>
+                    </a:cell3D>
+                  </a:tcPr>
+                </a:tc>
+                <a:extLst>
+                  <a:ext uri="{0D108BD9-81ED-4DB2-BD59-A6C34878D82A}">
+                    <a16:rowId xmlns:a16="http://schemas.microsoft.com/office/drawing/2014/main" val="980658539"/>
+                  </a:ext>
+                </a:extLst>
+              </a:tr>
+              <a:tr h="461216">
+                <a:tc>
+                  <a:txBody>
+                    <a:bodyPr/>
+                    <a:lstStyle/>
+                    <a:p>
+                      <a:endParaRPr lang="fr-FR" dirty="0"/>
+                    </a:p>
+                  </a:txBody>
+                  <a:tcPr>
+                    <a:lnL w="12700" cap="flat" cmpd="sng" algn="ctr">
+                      <a:solidFill>
+                        <a:schemeClr val="tx1"/>
+                      </a:solidFill>
+                      <a:prstDash val="solid"/>
+                      <a:round/>
+                      <a:headEnd type="none" w="med" len="med"/>
+                      <a:tailEnd type="none" w="med" len="med"/>
+                    </a:lnL>
+                    <a:lnR w="12700" cap="flat" cmpd="sng" algn="ctr">
+                      <a:solidFill>
+                        <a:schemeClr val="tx1"/>
+                      </a:solidFill>
+                      <a:prstDash val="solid"/>
+                      <a:round/>
+                      <a:headEnd type="none" w="med" len="med"/>
+                      <a:tailEnd type="none" w="med" len="med"/>
+                    </a:lnR>
+                    <a:lnT w="12700" cap="flat" cmpd="sng" algn="ctr">
+                      <a:solidFill>
+                        <a:schemeClr val="tx1"/>
+                      </a:solidFill>
+                      <a:prstDash val="solid"/>
+                      <a:round/>
+                      <a:headEnd type="none" w="med" len="med"/>
+                      <a:tailEnd type="none" w="med" len="med"/>
+                    </a:lnT>
+                    <a:lnB w="12700" cap="flat" cmpd="sng" algn="ctr">
+                      <a:solidFill>
+                        <a:schemeClr val="tx1"/>
+                      </a:solidFill>
+                      <a:prstDash val="solid"/>
+                      <a:round/>
+                      <a:headEnd type="none" w="med" len="med"/>
+                      <a:tailEnd type="none" w="med" len="med"/>
+                    </a:lnB>
+                    <a:cell3D prstMaterial="dkEdge">
+                      <a:bevel/>
+                      <a:lightRig rig="flood" dir="t"/>
+                    </a:cell3D>
+                  </a:tcPr>
+                </a:tc>
+                <a:tc>
+                  <a:txBody>
+                    <a:bodyPr/>
+                    <a:lstStyle/>
+                    <a:p>
+                      <a:r>
+                        <a:rPr lang="fr-FR" dirty="0"/>
+                        <a:t>Position zéro</a:t>
+                      </a:r>
+                    </a:p>
+                  </a:txBody>
+                  <a:tcPr>
+                    <a:lnL w="12700" cap="flat" cmpd="sng" algn="ctr">
+                      <a:solidFill>
+                        <a:schemeClr val="tx1"/>
+                      </a:solidFill>
+                      <a:prstDash val="solid"/>
+                      <a:round/>
+                      <a:headEnd type="none" w="med" len="med"/>
+                      <a:tailEnd type="none" w="med" len="med"/>
+                    </a:lnL>
+                    <a:lnR w="12700" cap="flat" cmpd="sng" algn="ctr">
+                      <a:solidFill>
+                        <a:schemeClr val="tx1"/>
+                      </a:solidFill>
+                      <a:prstDash val="solid"/>
+                      <a:round/>
+                      <a:headEnd type="none" w="med" len="med"/>
+                      <a:tailEnd type="none" w="med" len="med"/>
+                    </a:lnR>
+                    <a:lnT w="12700" cap="flat" cmpd="sng" algn="ctr">
+                      <a:solidFill>
+                        <a:schemeClr val="tx1"/>
+                      </a:solidFill>
+                      <a:prstDash val="solid"/>
+                      <a:round/>
+                      <a:headEnd type="none" w="med" len="med"/>
+                      <a:tailEnd type="none" w="med" len="med"/>
+                    </a:lnT>
+                    <a:lnB w="12700" cap="flat" cmpd="sng" algn="ctr">
+                      <a:solidFill>
+                        <a:schemeClr val="tx1"/>
+                      </a:solidFill>
+                      <a:prstDash val="solid"/>
+                      <a:round/>
+                      <a:headEnd type="none" w="med" len="med"/>
+                      <a:tailEnd type="none" w="med" len="med"/>
+                    </a:lnB>
+                    <a:cell3D prstMaterial="dkEdge">
+                      <a:bevel/>
+                      <a:lightRig rig="flood" dir="t"/>
+                    </a:cell3D>
+                  </a:tcPr>
+                </a:tc>
+                <a:tc>
+                  <a:txBody>
+                    <a:bodyPr/>
+                    <a:lstStyle/>
+                    <a:p>
+                      <a:r>
+                        <a:rPr lang="fr-FR" dirty="0"/>
+                        <a:t>Macro-frottis</a:t>
+                      </a:r>
+                    </a:p>
+                  </a:txBody>
+                  <a:tcPr>
+                    <a:lnL w="12700" cap="flat" cmpd="sng" algn="ctr">
+                      <a:solidFill>
+                        <a:schemeClr val="tx1"/>
+                      </a:solidFill>
+                      <a:prstDash val="solid"/>
+                      <a:round/>
+                      <a:headEnd type="none" w="med" len="med"/>
+                      <a:tailEnd type="none" w="med" len="med"/>
+                    </a:lnL>
+                    <a:lnR w="12700" cap="flat" cmpd="sng" algn="ctr">
+                      <a:solidFill>
+                        <a:schemeClr val="tx1"/>
+                      </a:solidFill>
+                      <a:prstDash val="solid"/>
+                      <a:round/>
+                      <a:headEnd type="none" w="med" len="med"/>
+                      <a:tailEnd type="none" w="med" len="med"/>
+                    </a:lnR>
+                    <a:lnT w="12700" cap="flat" cmpd="sng" algn="ctr">
+                      <a:solidFill>
+                        <a:schemeClr val="tx1"/>
+                      </a:solidFill>
+                      <a:prstDash val="solid"/>
+                      <a:round/>
+                      <a:headEnd type="none" w="med" len="med"/>
+                      <a:tailEnd type="none" w="med" len="med"/>
+                    </a:lnT>
+                    <a:lnB w="12700" cap="flat" cmpd="sng" algn="ctr">
+                      <a:solidFill>
+                        <a:schemeClr val="tx1"/>
+                      </a:solidFill>
+                      <a:prstDash val="solid"/>
+                      <a:round/>
+                      <a:headEnd type="none" w="med" len="med"/>
+                      <a:tailEnd type="none" w="med" len="med"/>
+                    </a:lnB>
+                    <a:cell3D prstMaterial="dkEdge">
+                      <a:bevel/>
+                      <a:lightRig rig="flood" dir="t"/>
+                    </a:cell3D>
+                  </a:tcPr>
+                </a:tc>
+                <a:extLst>
+                  <a:ext uri="{0D108BD9-81ED-4DB2-BD59-A6C34878D82A}">
+                    <a16:rowId xmlns:a16="http://schemas.microsoft.com/office/drawing/2014/main" val="4182417412"/>
+                  </a:ext>
+                </a:extLst>
+              </a:tr>
+            </a:tbl>
+          </a:graphicData>
+        </a:graphic>
+      </p:graphicFrame>
+      <p:graphicFrame>
+        <p:nvGraphicFramePr>
+          <p:cNvPr id="11" name="Tableau 9">
+            <a:extLst>
+              <a:ext uri="{FF2B5EF4-FFF2-40B4-BE49-F238E27FC236}">
+                <a16:creationId xmlns:a16="http://schemas.microsoft.com/office/drawing/2014/main" id="{BB50F082-D825-1F09-C655-253ACEAF3164}"/>
+              </a:ext>
+            </a:extLst>
+          </p:cNvPr>
+          <p:cNvGraphicFramePr>
+            <a:graphicFrameLocks noGrp="1"/>
+          </p:cNvGraphicFramePr>
+          <p:nvPr>
+            <p:extLst>
+              <p:ext uri="{D42A27DB-BD31-4B8C-83A1-F6EECF244321}">
+                <p14:modId xmlns:p14="http://schemas.microsoft.com/office/powerpoint/2010/main" val="1411106132"/>
+              </p:ext>
+            </p:extLst>
+          </p:nvPr>
+        </p:nvGraphicFramePr>
+        <p:xfrm>
+          <a:off x="358454" y="3867238"/>
+          <a:ext cx="3320982" cy="1040336"/>
+        </p:xfrm>
+        <a:graphic>
+          <a:graphicData uri="http://schemas.openxmlformats.org/drawingml/2006/table">
+            <a:tbl>
+              <a:tblPr firstRow="1" bandRow="1">
+                <a:tableStyleId>{2D5ABB26-0587-4C30-8999-92F81FD0307C}</a:tableStyleId>
+              </a:tblPr>
+              <a:tblGrid>
+                <a:gridCol w="1106994">
+                  <a:extLst>
+                    <a:ext uri="{9D8B030D-6E8A-4147-A177-3AD203B41FA5}">
+                      <a16:colId xmlns:a16="http://schemas.microsoft.com/office/drawing/2014/main" val="1244037658"/>
+                    </a:ext>
+                  </a:extLst>
+                </a:gridCol>
+                <a:gridCol w="914768">
+                  <a:extLst>
+                    <a:ext uri="{9D8B030D-6E8A-4147-A177-3AD203B41FA5}">
+                      <a16:colId xmlns:a16="http://schemas.microsoft.com/office/drawing/2014/main" val="3908260985"/>
+                    </a:ext>
+                  </a:extLst>
+                </a:gridCol>
+                <a:gridCol w="1299220">
+                  <a:extLst>
+                    <a:ext uri="{9D8B030D-6E8A-4147-A177-3AD203B41FA5}">
+                      <a16:colId xmlns:a16="http://schemas.microsoft.com/office/drawing/2014/main" val="284647492"/>
+                    </a:ext>
+                  </a:extLst>
+                </a:gridCol>
+              </a:tblGrid>
+              <a:tr h="461216">
+                <a:tc>
+                  <a:txBody>
+                    <a:bodyPr/>
+                    <a:lstStyle/>
+                    <a:p>
+                      <a:r>
+                        <a:rPr lang="fr-FR" dirty="0"/>
+                        <a:t>outil1</a:t>
+                      </a:r>
+                    </a:p>
+                  </a:txBody>
+                  <a:tcPr>
+                    <a:lnL w="12700" cap="flat" cmpd="sng" algn="ctr">
+                      <a:solidFill>
+                        <a:schemeClr val="tx1"/>
+                      </a:solidFill>
+                      <a:prstDash val="solid"/>
+                      <a:round/>
+                      <a:headEnd type="none" w="med" len="med"/>
+                      <a:tailEnd type="none" w="med" len="med"/>
+                    </a:lnL>
+                    <a:lnR w="12700" cap="flat" cmpd="sng" algn="ctr">
+                      <a:solidFill>
+                        <a:schemeClr val="tx1"/>
+                      </a:solidFill>
+                      <a:prstDash val="solid"/>
+                      <a:round/>
+                      <a:headEnd type="none" w="med" len="med"/>
+                      <a:tailEnd type="none" w="med" len="med"/>
+                    </a:lnR>
+                    <a:lnT w="12700" cap="flat" cmpd="sng" algn="ctr">
+                      <a:solidFill>
+                        <a:schemeClr val="tx1"/>
+                      </a:solidFill>
+                      <a:prstDash val="solid"/>
+                      <a:round/>
+                      <a:headEnd type="none" w="med" len="med"/>
+                      <a:tailEnd type="none" w="med" len="med"/>
+                    </a:lnT>
+                    <a:lnB w="12700" cap="flat" cmpd="sng" algn="ctr">
+                      <a:solidFill>
+                        <a:schemeClr val="tx1"/>
+                      </a:solidFill>
+                      <a:prstDash val="solid"/>
+                      <a:round/>
+                      <a:headEnd type="none" w="med" len="med"/>
+                      <a:tailEnd type="none" w="med" len="med"/>
+                    </a:lnB>
+                    <a:cell3D prstMaterial="dkEdge">
+                      <a:bevel/>
+                      <a:lightRig rig="flood" dir="t"/>
+                    </a:cell3D>
+                  </a:tcPr>
+                </a:tc>
+                <a:tc>
+                  <a:txBody>
+                    <a:bodyPr/>
+                    <a:lstStyle/>
+                    <a:p>
+                      <a:r>
+                        <a:rPr lang="fr-FR" dirty="0"/>
+                        <a:t>outil2</a:t>
+                      </a:r>
+                    </a:p>
+                  </a:txBody>
+                  <a:tcPr>
+                    <a:lnL w="12700" cap="flat" cmpd="sng" algn="ctr">
+                      <a:solidFill>
+                        <a:schemeClr val="tx1"/>
+                      </a:solidFill>
+                      <a:prstDash val="solid"/>
+                      <a:round/>
+                      <a:headEnd type="none" w="med" len="med"/>
+                      <a:tailEnd type="none" w="med" len="med"/>
+                    </a:lnL>
+                    <a:lnR w="12700" cap="flat" cmpd="sng" algn="ctr">
+                      <a:solidFill>
+                        <a:schemeClr val="tx1"/>
+                      </a:solidFill>
+                      <a:prstDash val="solid"/>
+                      <a:round/>
+                      <a:headEnd type="none" w="med" len="med"/>
+                      <a:tailEnd type="none" w="med" len="med"/>
+                    </a:lnR>
+                    <a:lnT w="12700" cap="flat" cmpd="sng" algn="ctr">
+                      <a:solidFill>
+                        <a:schemeClr val="tx1"/>
+                      </a:solidFill>
+                      <a:prstDash val="solid"/>
+                      <a:round/>
+                      <a:headEnd type="none" w="med" len="med"/>
+                      <a:tailEnd type="none" w="med" len="med"/>
+                    </a:lnT>
+                    <a:lnB w="12700" cap="flat" cmpd="sng" algn="ctr">
+                      <a:solidFill>
+                        <a:schemeClr val="tx1"/>
+                      </a:solidFill>
+                      <a:prstDash val="solid"/>
+                      <a:round/>
+                      <a:headEnd type="none" w="med" len="med"/>
+                      <a:tailEnd type="none" w="med" len="med"/>
+                    </a:lnB>
+                    <a:cell3D prstMaterial="dkEdge">
+                      <a:bevel/>
+                      <a:lightRig rig="flood" dir="t"/>
+                    </a:cell3D>
+                  </a:tcPr>
+                </a:tc>
+                <a:tc>
+                  <a:txBody>
+                    <a:bodyPr/>
+                    <a:lstStyle/>
+                    <a:p>
+                      <a:r>
+                        <a:rPr lang="fr-FR" dirty="0"/>
+                        <a:t>outil3</a:t>
+                      </a:r>
+                    </a:p>
+                  </a:txBody>
+                  <a:tcPr>
+                    <a:lnL w="12700" cap="flat" cmpd="sng" algn="ctr">
+                      <a:solidFill>
+                        <a:schemeClr val="tx1"/>
+                      </a:solidFill>
+                      <a:prstDash val="solid"/>
+                      <a:round/>
+                      <a:headEnd type="none" w="med" len="med"/>
+                      <a:tailEnd type="none" w="med" len="med"/>
+                    </a:lnL>
+                    <a:lnR w="12700" cap="flat" cmpd="sng" algn="ctr">
+                      <a:solidFill>
+                        <a:schemeClr val="tx1"/>
+                      </a:solidFill>
+                      <a:prstDash val="solid"/>
+                      <a:round/>
+                      <a:headEnd type="none" w="med" len="med"/>
+                      <a:tailEnd type="none" w="med" len="med"/>
+                    </a:lnR>
+                    <a:lnT w="12700" cap="flat" cmpd="sng" algn="ctr">
+                      <a:solidFill>
+                        <a:schemeClr val="tx1"/>
+                      </a:solidFill>
+                      <a:prstDash val="solid"/>
+                      <a:round/>
+                      <a:headEnd type="none" w="med" len="med"/>
+                      <a:tailEnd type="none" w="med" len="med"/>
+                    </a:lnT>
+                    <a:lnB w="12700" cap="flat" cmpd="sng" algn="ctr">
+                      <a:solidFill>
+                        <a:schemeClr val="tx1"/>
+                      </a:solidFill>
+                      <a:prstDash val="solid"/>
+                      <a:round/>
+                      <a:headEnd type="none" w="med" len="med"/>
+                      <a:tailEnd type="none" w="med" len="med"/>
+                    </a:lnB>
+                    <a:cell3D prstMaterial="dkEdge">
+                      <a:bevel/>
+                      <a:lightRig rig="flood" dir="t"/>
+                    </a:cell3D>
+                  </a:tcPr>
+                </a:tc>
+                <a:extLst>
+                  <a:ext uri="{0D108BD9-81ED-4DB2-BD59-A6C34878D82A}">
+                    <a16:rowId xmlns:a16="http://schemas.microsoft.com/office/drawing/2014/main" val="980658539"/>
+                  </a:ext>
+                </a:extLst>
+              </a:tr>
+              <a:tr h="461216">
+                <a:tc>
+                  <a:txBody>
+                    <a:bodyPr/>
+                    <a:lstStyle/>
+                    <a:p>
+                      <a:r>
+                        <a:rPr lang="fr-FR" dirty="0"/>
+                        <a:t>éclairage</a:t>
+                      </a:r>
+                    </a:p>
+                  </a:txBody>
+                  <a:tcPr>
+                    <a:lnL w="12700" cap="flat" cmpd="sng" algn="ctr">
+                      <a:solidFill>
+                        <a:schemeClr val="tx1"/>
+                      </a:solidFill>
+                      <a:prstDash val="solid"/>
+                      <a:round/>
+                      <a:headEnd type="none" w="med" len="med"/>
+                      <a:tailEnd type="none" w="med" len="med"/>
+                    </a:lnL>
+                    <a:lnR w="12700" cap="flat" cmpd="sng" algn="ctr">
+                      <a:solidFill>
+                        <a:schemeClr val="tx1"/>
+                      </a:solidFill>
+                      <a:prstDash val="solid"/>
+                      <a:round/>
+                      <a:headEnd type="none" w="med" len="med"/>
+                      <a:tailEnd type="none" w="med" len="med"/>
+                    </a:lnR>
+                    <a:lnT w="12700" cap="flat" cmpd="sng" algn="ctr">
+                      <a:solidFill>
+                        <a:schemeClr val="tx1"/>
+                      </a:solidFill>
+                      <a:prstDash val="solid"/>
+                      <a:round/>
+                      <a:headEnd type="none" w="med" len="med"/>
+                      <a:tailEnd type="none" w="med" len="med"/>
+                    </a:lnT>
+                    <a:lnB w="12700" cap="flat" cmpd="sng" algn="ctr">
+                      <a:solidFill>
+                        <a:schemeClr val="tx1"/>
+                      </a:solidFill>
+                      <a:prstDash val="solid"/>
+                      <a:round/>
+                      <a:headEnd type="none" w="med" len="med"/>
+                      <a:tailEnd type="none" w="med" len="med"/>
+                    </a:lnB>
+                    <a:cell3D prstMaterial="dkEdge">
+                      <a:bevel/>
+                      <a:lightRig rig="flood" dir="t"/>
+                    </a:cell3D>
+                  </a:tcPr>
+                </a:tc>
+                <a:tc>
+                  <a:txBody>
+                    <a:bodyPr/>
+                    <a:lstStyle/>
+                    <a:p>
+                      <a:endParaRPr lang="fr-FR" dirty="0"/>
+                    </a:p>
+                  </a:txBody>
+                  <a:tcPr>
+                    <a:lnL w="12700" cap="flat" cmpd="sng" algn="ctr">
+                      <a:solidFill>
+                        <a:schemeClr val="tx1"/>
+                      </a:solidFill>
+                      <a:prstDash val="solid"/>
+                      <a:round/>
+                      <a:headEnd type="none" w="med" len="med"/>
+                      <a:tailEnd type="none" w="med" len="med"/>
+                    </a:lnL>
+                    <a:lnR w="12700" cap="flat" cmpd="sng" algn="ctr">
+                      <a:solidFill>
+                        <a:schemeClr val="tx1"/>
+                      </a:solidFill>
+                      <a:prstDash val="solid"/>
+                      <a:round/>
+                      <a:headEnd type="none" w="med" len="med"/>
+                      <a:tailEnd type="none" w="med" len="med"/>
+                    </a:lnR>
+                    <a:lnT w="12700" cap="flat" cmpd="sng" algn="ctr">
+                      <a:solidFill>
+                        <a:schemeClr val="tx1"/>
+                      </a:solidFill>
+                      <a:prstDash val="solid"/>
+                      <a:round/>
+                      <a:headEnd type="none" w="med" len="med"/>
+                      <a:tailEnd type="none" w="med" len="med"/>
+                    </a:lnT>
+                    <a:lnB w="12700" cap="flat" cmpd="sng" algn="ctr">
+                      <a:solidFill>
+                        <a:schemeClr val="tx1"/>
+                      </a:solidFill>
+                      <a:prstDash val="solid"/>
+                      <a:round/>
+                      <a:headEnd type="none" w="med" len="med"/>
+                      <a:tailEnd type="none" w="med" len="med"/>
+                    </a:lnB>
+                    <a:cell3D prstMaterial="dkEdge">
+                      <a:bevel/>
+                      <a:lightRig rig="flood" dir="t"/>
+                    </a:cell3D>
+                  </a:tcPr>
+                </a:tc>
+                <a:tc>
+                  <a:txBody>
+                    <a:bodyPr/>
+                    <a:lstStyle/>
+                    <a:p>
+                      <a:r>
+                        <a:rPr lang="fr-FR" sz="1600" dirty="0"/>
+                        <a:t>Mode prélèvement</a:t>
+                      </a:r>
+                    </a:p>
+                  </a:txBody>
+                  <a:tcPr>
+                    <a:lnL w="12700" cap="flat" cmpd="sng" algn="ctr">
+                      <a:solidFill>
+                        <a:schemeClr val="tx1"/>
+                      </a:solidFill>
+                      <a:prstDash val="solid"/>
+                      <a:round/>
+                      <a:headEnd type="none" w="med" len="med"/>
+                      <a:tailEnd type="none" w="med" len="med"/>
+                    </a:lnL>
+                    <a:lnR w="12700" cap="flat" cmpd="sng" algn="ctr">
+                      <a:solidFill>
+                        <a:schemeClr val="tx1"/>
+                      </a:solidFill>
+                      <a:prstDash val="solid"/>
+                      <a:round/>
+                      <a:headEnd type="none" w="med" len="med"/>
+                      <a:tailEnd type="none" w="med" len="med"/>
+                    </a:lnR>
+                    <a:lnT w="12700" cap="flat" cmpd="sng" algn="ctr">
+                      <a:solidFill>
+                        <a:schemeClr val="tx1"/>
+                      </a:solidFill>
+                      <a:prstDash val="solid"/>
+                      <a:round/>
+                      <a:headEnd type="none" w="med" len="med"/>
+                      <a:tailEnd type="none" w="med" len="med"/>
+                    </a:lnT>
+                    <a:lnB w="12700" cap="flat" cmpd="sng" algn="ctr">
+                      <a:solidFill>
+                        <a:schemeClr val="tx1"/>
+                      </a:solidFill>
+                      <a:prstDash val="solid"/>
+                      <a:round/>
+                      <a:headEnd type="none" w="med" len="med"/>
+                      <a:tailEnd type="none" w="med" len="med"/>
+                    </a:lnB>
+                    <a:cell3D prstMaterial="dkEdge">
+                      <a:bevel/>
+                      <a:lightRig rig="flood" dir="t"/>
+                    </a:cell3D>
+                  </a:tcPr>
+                </a:tc>
+                <a:extLst>
+                  <a:ext uri="{0D108BD9-81ED-4DB2-BD59-A6C34878D82A}">
+                    <a16:rowId xmlns:a16="http://schemas.microsoft.com/office/drawing/2014/main" val="4182417412"/>
+                  </a:ext>
+                </a:extLst>
+              </a:tr>
+            </a:tbl>
+          </a:graphicData>
+        </a:graphic>
+      </p:graphicFrame>
+      <p:grpSp>
+        <p:nvGrpSpPr>
+          <p:cNvPr id="28" name="Groupe 27">
+            <a:extLst>
+              <a:ext uri="{FF2B5EF4-FFF2-40B4-BE49-F238E27FC236}">
+                <a16:creationId xmlns:a16="http://schemas.microsoft.com/office/drawing/2014/main" id="{17036981-54F2-2815-63E0-487347BBB870}"/>
+              </a:ext>
+            </a:extLst>
+          </p:cNvPr>
+          <p:cNvGrpSpPr/>
+          <p:nvPr/>
+        </p:nvGrpSpPr>
+        <p:grpSpPr>
+          <a:xfrm>
+            <a:off x="8197084" y="763457"/>
+            <a:ext cx="3529862" cy="2198417"/>
+            <a:chOff x="8547830" y="1469486"/>
+            <a:chExt cx="3529862" cy="2198417"/>
+          </a:xfrm>
+        </p:grpSpPr>
+        <p:sp>
+          <p:nvSpPr>
+            <p:cNvPr id="13" name="ZoneTexte 12">
+              <a:extLst>
+                <a:ext uri="{FF2B5EF4-FFF2-40B4-BE49-F238E27FC236}">
+                  <a16:creationId xmlns:a16="http://schemas.microsoft.com/office/drawing/2014/main" id="{DA79B987-EC00-2D3B-908E-3EFD1AAF1B5F}"/>
+                </a:ext>
+              </a:extLst>
+            </p:cNvPr>
+            <p:cNvSpPr txBox="1"/>
+            <p:nvPr/>
+          </p:nvSpPr>
+          <p:spPr>
+            <a:xfrm>
+              <a:off x="10169886" y="2207494"/>
+              <a:ext cx="1594765" cy="369332"/>
+            </a:xfrm>
+            <a:prstGeom prst="rect">
+              <a:avLst/>
+            </a:prstGeom>
+            <a:noFill/>
+          </p:spPr>
+          <p:txBody>
+            <a:bodyPr wrap="square" rtlCol="0">
+              <a:spAutoFit/>
+            </a:bodyPr>
+            <a:lstStyle/>
+            <a:p>
+              <a:r>
+                <a:rPr lang="fr-FR" dirty="0">
+                  <a:solidFill>
+                    <a:srgbClr val="FF0000"/>
+                  </a:solidFill>
+                </a:rPr>
+                <a:t>gauche-droite</a:t>
+              </a:r>
+            </a:p>
+          </p:txBody>
+        </p:sp>
+        <p:sp>
+          <p:nvSpPr>
+            <p:cNvPr id="14" name="ZoneTexte 13">
+              <a:extLst>
+                <a:ext uri="{FF2B5EF4-FFF2-40B4-BE49-F238E27FC236}">
+                  <a16:creationId xmlns:a16="http://schemas.microsoft.com/office/drawing/2014/main" id="{8F82083D-5423-6726-727C-F4BD4A4E757F}"/>
+                </a:ext>
+              </a:extLst>
+            </p:cNvPr>
+            <p:cNvSpPr txBox="1"/>
+            <p:nvPr/>
+          </p:nvSpPr>
+          <p:spPr>
+            <a:xfrm>
+              <a:off x="8547830" y="2477596"/>
+              <a:ext cx="462946" cy="369332"/>
+            </a:xfrm>
+            <a:prstGeom prst="rect">
+              <a:avLst/>
+            </a:prstGeom>
+            <a:noFill/>
+          </p:spPr>
+          <p:txBody>
+            <a:bodyPr wrap="square" rtlCol="0">
+              <a:spAutoFit/>
+            </a:bodyPr>
+            <a:lstStyle/>
+            <a:p>
+              <a:r>
+                <a:rPr lang="fr-FR" dirty="0">
+                  <a:solidFill>
+                    <a:srgbClr val="FF0000"/>
+                  </a:solidFill>
+                </a:rPr>
+                <a:t>-1</a:t>
+              </a:r>
+            </a:p>
+          </p:txBody>
+        </p:sp>
+        <p:sp>
+          <p:nvSpPr>
+            <p:cNvPr id="15" name="ZoneTexte 14">
+              <a:extLst>
+                <a:ext uri="{FF2B5EF4-FFF2-40B4-BE49-F238E27FC236}">
+                  <a16:creationId xmlns:a16="http://schemas.microsoft.com/office/drawing/2014/main" id="{E04EECED-0003-EAA0-969E-54243B658A37}"/>
+                </a:ext>
+              </a:extLst>
+            </p:cNvPr>
+            <p:cNvSpPr txBox="1"/>
+            <p:nvPr/>
+          </p:nvSpPr>
+          <p:spPr>
+            <a:xfrm>
+              <a:off x="10156710" y="2477596"/>
+              <a:ext cx="487941" cy="369332"/>
+            </a:xfrm>
+            <a:prstGeom prst="rect">
+              <a:avLst/>
+            </a:prstGeom>
+            <a:noFill/>
+          </p:spPr>
+          <p:txBody>
+            <a:bodyPr wrap="square" rtlCol="0">
+              <a:spAutoFit/>
+            </a:bodyPr>
+            <a:lstStyle/>
+            <a:p>
+              <a:r>
+                <a:rPr lang="fr-FR" dirty="0">
+                  <a:solidFill>
+                    <a:srgbClr val="FF0000"/>
+                  </a:solidFill>
+                </a:rPr>
+                <a:t>1</a:t>
+              </a:r>
+            </a:p>
+          </p:txBody>
+        </p:sp>
+        <p:sp>
+          <p:nvSpPr>
+            <p:cNvPr id="16" name="ZoneTexte 15">
+              <a:extLst>
+                <a:ext uri="{FF2B5EF4-FFF2-40B4-BE49-F238E27FC236}">
+                  <a16:creationId xmlns:a16="http://schemas.microsoft.com/office/drawing/2014/main" id="{D7564780-C213-1B8C-603E-494FFABAA806}"/>
+                </a:ext>
+              </a:extLst>
+            </p:cNvPr>
+            <p:cNvSpPr txBox="1"/>
+            <p:nvPr/>
+          </p:nvSpPr>
+          <p:spPr>
+            <a:xfrm>
+              <a:off x="9777953" y="3113905"/>
+              <a:ext cx="1420150" cy="369332"/>
+            </a:xfrm>
+            <a:prstGeom prst="rect">
+              <a:avLst/>
+            </a:prstGeom>
+            <a:noFill/>
+          </p:spPr>
+          <p:txBody>
+            <a:bodyPr wrap="square" rtlCol="0">
+              <a:spAutoFit/>
+            </a:bodyPr>
+            <a:lstStyle/>
+            <a:p>
+              <a:r>
+                <a:rPr lang="fr-FR" dirty="0">
+                  <a:solidFill>
+                    <a:schemeClr val="accent6"/>
+                  </a:solidFill>
+                </a:rPr>
+                <a:t>avant-arrière</a:t>
+              </a:r>
+            </a:p>
+          </p:txBody>
+        </p:sp>
+        <p:sp>
+          <p:nvSpPr>
+            <p:cNvPr id="17" name="ZoneTexte 16">
+              <a:extLst>
+                <a:ext uri="{FF2B5EF4-FFF2-40B4-BE49-F238E27FC236}">
+                  <a16:creationId xmlns:a16="http://schemas.microsoft.com/office/drawing/2014/main" id="{9513A13F-C3BF-BC05-E8B6-37006FA58B5E}"/>
+                </a:ext>
+              </a:extLst>
+            </p:cNvPr>
+            <p:cNvSpPr txBox="1"/>
+            <p:nvPr/>
+          </p:nvSpPr>
+          <p:spPr>
+            <a:xfrm>
+              <a:off x="9357575" y="3298571"/>
+              <a:ext cx="487941" cy="369332"/>
+            </a:xfrm>
+            <a:prstGeom prst="rect">
+              <a:avLst/>
+            </a:prstGeom>
+            <a:noFill/>
+          </p:spPr>
+          <p:txBody>
+            <a:bodyPr wrap="square" rtlCol="0">
+              <a:spAutoFit/>
+            </a:bodyPr>
+            <a:lstStyle/>
+            <a:p>
+              <a:r>
+                <a:rPr lang="fr-FR" dirty="0">
+                  <a:solidFill>
+                    <a:schemeClr val="accent6"/>
+                  </a:solidFill>
+                </a:rPr>
+                <a:t>1</a:t>
+              </a:r>
+            </a:p>
+          </p:txBody>
+        </p:sp>
+        <p:sp>
+          <p:nvSpPr>
+            <p:cNvPr id="18" name="ZoneTexte 17">
+              <a:extLst>
+                <a:ext uri="{FF2B5EF4-FFF2-40B4-BE49-F238E27FC236}">
+                  <a16:creationId xmlns:a16="http://schemas.microsoft.com/office/drawing/2014/main" id="{4F78AA0B-ECF9-E1D7-A6C0-6FF2B0DEC866}"/>
+                </a:ext>
+              </a:extLst>
+            </p:cNvPr>
+            <p:cNvSpPr txBox="1"/>
+            <p:nvPr/>
+          </p:nvSpPr>
+          <p:spPr>
+            <a:xfrm>
+              <a:off x="9268401" y="1675293"/>
+              <a:ext cx="462946" cy="369332"/>
+            </a:xfrm>
+            <a:prstGeom prst="rect">
+              <a:avLst/>
+            </a:prstGeom>
+            <a:noFill/>
+          </p:spPr>
+          <p:txBody>
+            <a:bodyPr wrap="square" rtlCol="0">
+              <a:spAutoFit/>
+            </a:bodyPr>
+            <a:lstStyle/>
+            <a:p>
+              <a:r>
+                <a:rPr lang="fr-FR" dirty="0">
+                  <a:solidFill>
+                    <a:schemeClr val="accent6"/>
+                  </a:solidFill>
+                </a:rPr>
+                <a:t>-1</a:t>
+              </a:r>
+            </a:p>
+          </p:txBody>
+        </p:sp>
+        <p:sp>
+          <p:nvSpPr>
+            <p:cNvPr id="22" name="ZoneTexte 21">
+              <a:extLst>
+                <a:ext uri="{FF2B5EF4-FFF2-40B4-BE49-F238E27FC236}">
+                  <a16:creationId xmlns:a16="http://schemas.microsoft.com/office/drawing/2014/main" id="{D855C49D-7A98-1D9C-521E-D0528D28DCF6}"/>
+                </a:ext>
+              </a:extLst>
+            </p:cNvPr>
+            <p:cNvSpPr txBox="1"/>
+            <p:nvPr/>
+          </p:nvSpPr>
+          <p:spPr>
+            <a:xfrm>
+              <a:off x="9912739" y="1715762"/>
+              <a:ext cx="487941" cy="369332"/>
+            </a:xfrm>
+            <a:prstGeom prst="rect">
+              <a:avLst/>
+            </a:prstGeom>
+            <a:noFill/>
+          </p:spPr>
+          <p:txBody>
+            <a:bodyPr wrap="square" rtlCol="0">
+              <a:spAutoFit/>
+            </a:bodyPr>
+            <a:lstStyle/>
+            <a:p>
+              <a:r>
+                <a:rPr lang="fr-FR" dirty="0">
+                  <a:solidFill>
+                    <a:schemeClr val="accent2"/>
+                  </a:solidFill>
+                </a:rPr>
+                <a:t>1</a:t>
+              </a:r>
+            </a:p>
+          </p:txBody>
+        </p:sp>
+        <p:sp>
+          <p:nvSpPr>
+            <p:cNvPr id="23" name="ZoneTexte 22">
+              <a:extLst>
+                <a:ext uri="{FF2B5EF4-FFF2-40B4-BE49-F238E27FC236}">
+                  <a16:creationId xmlns:a16="http://schemas.microsoft.com/office/drawing/2014/main" id="{862D7CDF-4A78-D61B-959E-D922F76414CE}"/>
+                </a:ext>
+              </a:extLst>
+            </p:cNvPr>
+            <p:cNvSpPr txBox="1"/>
+            <p:nvPr/>
+          </p:nvSpPr>
+          <p:spPr>
+            <a:xfrm>
+              <a:off x="8710362" y="1688017"/>
+              <a:ext cx="487941" cy="369332"/>
+            </a:xfrm>
+            <a:prstGeom prst="rect">
+              <a:avLst/>
+            </a:prstGeom>
+            <a:noFill/>
+          </p:spPr>
+          <p:txBody>
+            <a:bodyPr wrap="square" rtlCol="0">
+              <a:spAutoFit/>
+            </a:bodyPr>
+            <a:lstStyle/>
+            <a:p>
+              <a:r>
+                <a:rPr lang="fr-FR" dirty="0">
+                  <a:solidFill>
+                    <a:schemeClr val="accent2"/>
+                  </a:solidFill>
+                </a:rPr>
+                <a:t>-1</a:t>
+              </a:r>
+            </a:p>
+          </p:txBody>
+        </p:sp>
+        <p:sp>
+          <p:nvSpPr>
+            <p:cNvPr id="24" name="ZoneTexte 23">
+              <a:extLst>
+                <a:ext uri="{FF2B5EF4-FFF2-40B4-BE49-F238E27FC236}">
+                  <a16:creationId xmlns:a16="http://schemas.microsoft.com/office/drawing/2014/main" id="{D31C55D7-3006-BCF6-FBE6-455CDF39B398}"/>
+                </a:ext>
+              </a:extLst>
+            </p:cNvPr>
+            <p:cNvSpPr txBox="1"/>
+            <p:nvPr/>
+          </p:nvSpPr>
+          <p:spPr>
+            <a:xfrm>
+              <a:off x="10091197" y="1469486"/>
+              <a:ext cx="1986495" cy="369332"/>
+            </a:xfrm>
+            <a:prstGeom prst="rect">
+              <a:avLst/>
+            </a:prstGeom>
+            <a:noFill/>
+          </p:spPr>
+          <p:txBody>
+            <a:bodyPr wrap="square" rtlCol="0">
+              <a:spAutoFit/>
+            </a:bodyPr>
+            <a:lstStyle/>
+            <a:p>
+              <a:r>
+                <a:rPr lang="fr-FR" dirty="0">
+                  <a:solidFill>
+                    <a:schemeClr val="accent2"/>
+                  </a:solidFill>
+                </a:rPr>
+                <a:t>base gauche-droite</a:t>
+              </a:r>
+            </a:p>
+          </p:txBody>
+        </p:sp>
+      </p:grpSp>
+      <p:sp>
+        <p:nvSpPr>
+          <p:cNvPr id="20" name="Flèche : en arc 19">
+            <a:extLst>
+              <a:ext uri="{FF2B5EF4-FFF2-40B4-BE49-F238E27FC236}">
+                <a16:creationId xmlns:a16="http://schemas.microsoft.com/office/drawing/2014/main" id="{8AEB17AE-A0E5-3647-4683-34359F23E503}"/>
+              </a:ext>
+            </a:extLst>
+          </p:cNvPr>
+          <p:cNvSpPr/>
+          <p:nvPr/>
+        </p:nvSpPr>
+        <p:spPr>
+          <a:xfrm>
+            <a:off x="8922655" y="1193153"/>
+            <a:ext cx="896486" cy="869459"/>
+          </a:xfrm>
+          <a:prstGeom prst="circularArrow">
+            <a:avLst>
+              <a:gd name="adj1" fmla="val 12500"/>
+              <a:gd name="adj2" fmla="val 1142319"/>
+              <a:gd name="adj3" fmla="val 20457681"/>
+              <a:gd name="adj4" fmla="val 16076382"/>
+              <a:gd name="adj5" fmla="val 12500"/>
+            </a:avLst>
+          </a:prstGeom>
+          <a:solidFill>
+            <a:schemeClr val="accent2"/>
+          </a:solidFill>
+          <a:ln>
+            <a:noFill/>
+          </a:ln>
+        </p:spPr>
+        <p:style>
+          <a:lnRef idx="2">
+            <a:schemeClr val="accent1">
+              <a:shade val="15000"/>
+            </a:schemeClr>
+          </a:lnRef>
+          <a:fillRef idx="1">
+            <a:schemeClr val="accent1"/>
+          </a:fillRef>
+          <a:effectRef idx="0">
+            <a:schemeClr val="accent1"/>
+          </a:effectRef>
+          <a:fontRef idx="minor">
+            <a:schemeClr val="lt1"/>
+          </a:fontRef>
+        </p:style>
+        <p:txBody>
+          <a:bodyPr rtlCol="0" anchor="ctr"/>
+          <a:lstStyle/>
+          <a:p>
+            <a:pPr algn="ctr"/>
+            <a:endParaRPr lang="fr-FR">
+              <a:solidFill>
+                <a:schemeClr val="tx1"/>
+              </a:solidFill>
+            </a:endParaRPr>
+          </a:p>
+        </p:txBody>
+      </p:sp>
+      <p:sp>
+        <p:nvSpPr>
+          <p:cNvPr id="21" name="Flèche : en arc 20">
+            <a:extLst>
+              <a:ext uri="{FF2B5EF4-FFF2-40B4-BE49-F238E27FC236}">
+                <a16:creationId xmlns:a16="http://schemas.microsoft.com/office/drawing/2014/main" id="{9B5B3AED-10E7-40C9-73A2-42C8F0B1891C}"/>
+              </a:ext>
+            </a:extLst>
+          </p:cNvPr>
+          <p:cNvSpPr/>
+          <p:nvPr/>
+        </p:nvSpPr>
+        <p:spPr>
+          <a:xfrm flipH="1">
+            <a:off x="8474412" y="1193153"/>
+            <a:ext cx="896486" cy="869459"/>
+          </a:xfrm>
+          <a:prstGeom prst="circularArrow">
+            <a:avLst>
+              <a:gd name="adj1" fmla="val 12500"/>
+              <a:gd name="adj2" fmla="val 1142319"/>
+              <a:gd name="adj3" fmla="val 20457681"/>
+              <a:gd name="adj4" fmla="val 16076382"/>
+              <a:gd name="adj5" fmla="val 12500"/>
+            </a:avLst>
+          </a:prstGeom>
+          <a:solidFill>
+            <a:schemeClr val="accent2"/>
+          </a:solidFill>
+          <a:ln>
+            <a:noFill/>
+          </a:ln>
+        </p:spPr>
+        <p:style>
+          <a:lnRef idx="2">
+            <a:schemeClr val="accent1">
+              <a:shade val="15000"/>
+            </a:schemeClr>
+          </a:lnRef>
+          <a:fillRef idx="1">
+            <a:schemeClr val="accent1"/>
+          </a:fillRef>
+          <a:effectRef idx="0">
+            <a:schemeClr val="accent1"/>
+          </a:effectRef>
+          <a:fontRef idx="minor">
+            <a:schemeClr val="lt1"/>
+          </a:fontRef>
+        </p:style>
+        <p:txBody>
+          <a:bodyPr rtlCol="0" anchor="ctr"/>
+          <a:lstStyle/>
+          <a:p>
+            <a:pPr algn="ctr"/>
+            <a:endParaRPr lang="fr-FR">
+              <a:solidFill>
+                <a:schemeClr val="tx1"/>
+              </a:solidFill>
+            </a:endParaRPr>
+          </a:p>
+        </p:txBody>
+      </p:sp>
+      <p:sp>
+        <p:nvSpPr>
+          <p:cNvPr id="26" name="Flèche : double flèche horizontale 25">
+            <a:extLst>
+              <a:ext uri="{FF2B5EF4-FFF2-40B4-BE49-F238E27FC236}">
+                <a16:creationId xmlns:a16="http://schemas.microsoft.com/office/drawing/2014/main" id="{6B575F83-5E3D-2424-999A-EB3066020F04}"/>
+              </a:ext>
+            </a:extLst>
+          </p:cNvPr>
+          <p:cNvSpPr/>
+          <p:nvPr/>
+        </p:nvSpPr>
+        <p:spPr>
+          <a:xfrm>
+            <a:off x="8531190" y="1861161"/>
+            <a:ext cx="1264614" cy="164715"/>
+          </a:xfrm>
+          <a:prstGeom prst="leftRightArrow">
+            <a:avLst/>
+          </a:prstGeom>
+          <a:solidFill>
+            <a:srgbClr val="FF0000"/>
+          </a:solidFill>
+          <a:ln>
+            <a:noFill/>
+          </a:ln>
+        </p:spPr>
+        <p:style>
+          <a:lnRef idx="2">
+            <a:schemeClr val="accent1">
+              <a:shade val="15000"/>
+            </a:schemeClr>
+          </a:lnRef>
+          <a:fillRef idx="1">
+            <a:schemeClr val="accent1"/>
+          </a:fillRef>
+          <a:effectRef idx="0">
+            <a:schemeClr val="accent1"/>
+          </a:effectRef>
+          <a:fontRef idx="minor">
+            <a:schemeClr val="lt1"/>
+          </a:fontRef>
+        </p:style>
+        <p:txBody>
+          <a:bodyPr rtlCol="0" anchor="ctr"/>
+          <a:lstStyle/>
+          <a:p>
+            <a:pPr algn="ctr"/>
+            <a:endParaRPr lang="fr-FR"/>
+          </a:p>
+        </p:txBody>
+      </p:sp>
+      <p:sp>
+        <p:nvSpPr>
+          <p:cNvPr id="27" name="Flèche : double flèche verticale 26">
+            <a:extLst>
+              <a:ext uri="{FF2B5EF4-FFF2-40B4-BE49-F238E27FC236}">
+                <a16:creationId xmlns:a16="http://schemas.microsoft.com/office/drawing/2014/main" id="{293CF74E-BF67-B093-636C-E300C9CE94DD}"/>
+              </a:ext>
+            </a:extLst>
+          </p:cNvPr>
+          <p:cNvSpPr/>
+          <p:nvPr/>
+        </p:nvSpPr>
+        <p:spPr>
+          <a:xfrm>
+            <a:off x="9070077" y="1326707"/>
+            <a:ext cx="145964" cy="1265835"/>
+          </a:xfrm>
+          <a:prstGeom prst="upDownArrow">
+            <a:avLst/>
+          </a:prstGeom>
+          <a:solidFill>
+            <a:schemeClr val="accent6"/>
+          </a:solidFill>
+          <a:ln>
+            <a:noFill/>
+          </a:ln>
+        </p:spPr>
+        <p:style>
+          <a:lnRef idx="2">
+            <a:schemeClr val="accent1">
+              <a:shade val="15000"/>
+            </a:schemeClr>
+          </a:lnRef>
+          <a:fillRef idx="1">
+            <a:schemeClr val="accent1"/>
+          </a:fillRef>
+          <a:effectRef idx="0">
+            <a:schemeClr val="accent1"/>
+          </a:effectRef>
+          <a:fontRef idx="minor">
+            <a:schemeClr val="lt1"/>
+          </a:fontRef>
+        </p:style>
+        <p:txBody>
+          <a:bodyPr rtlCol="0" anchor="ctr"/>
+          <a:lstStyle/>
+          <a:p>
+            <a:pPr algn="ctr"/>
+            <a:endParaRPr lang="fr-FR"/>
+          </a:p>
+        </p:txBody>
+      </p:sp>
+      <p:grpSp>
+        <p:nvGrpSpPr>
+          <p:cNvPr id="36" name="Groupe 35">
+            <a:extLst>
+              <a:ext uri="{FF2B5EF4-FFF2-40B4-BE49-F238E27FC236}">
+                <a16:creationId xmlns:a16="http://schemas.microsoft.com/office/drawing/2014/main" id="{08746289-6935-B434-4422-5F39756535B8}"/>
+              </a:ext>
+            </a:extLst>
+          </p:cNvPr>
+          <p:cNvGrpSpPr/>
+          <p:nvPr/>
+        </p:nvGrpSpPr>
+        <p:grpSpPr>
+          <a:xfrm>
+            <a:off x="3855481" y="1881453"/>
+            <a:ext cx="4122820" cy="4634518"/>
+            <a:chOff x="4034590" y="1890880"/>
+            <a:chExt cx="4122820" cy="4634518"/>
+          </a:xfrm>
+        </p:grpSpPr>
+        <p:pic>
+          <p:nvPicPr>
+            <p:cNvPr id="5" name="Image 4" descr="Une image contenant texte, diagramme, conception&#10;&#10;Description générée automatiquement">
+              <a:extLst>
+                <a:ext uri="{FF2B5EF4-FFF2-40B4-BE49-F238E27FC236}">
+                  <a16:creationId xmlns:a16="http://schemas.microsoft.com/office/drawing/2014/main" id="{A73F16C1-81AA-BF22-6E0E-3AED82694621}"/>
+                </a:ext>
+              </a:extLst>
+            </p:cNvPr>
+            <p:cNvPicPr>
+              <a:picLocks noChangeAspect="1"/>
+            </p:cNvPicPr>
+            <p:nvPr/>
+          </p:nvPicPr>
+          <p:blipFill rotWithShape="1">
+            <a:blip r:embed="rId2">
+              <a:extLst>
+                <a:ext uri="{28A0092B-C50C-407E-A947-70E740481C1C}">
+                  <a14:useLocalDpi xmlns:a14="http://schemas.microsoft.com/office/drawing/2010/main" val="0"/>
+                </a:ext>
+              </a:extLst>
+            </a:blip>
+            <a:srcRect l="30787" t="62924" r="48996"/>
+            <a:stretch/>
+          </p:blipFill>
+          <p:spPr>
+            <a:xfrm>
+              <a:off x="4034590" y="1890880"/>
+              <a:ext cx="4122820" cy="4634518"/>
+            </a:xfrm>
+            <a:prstGeom prst="rect">
+              <a:avLst/>
+            </a:prstGeom>
+          </p:spPr>
+        </p:pic>
+        <p:sp>
+          <p:nvSpPr>
+            <p:cNvPr id="2" name="ZoneTexte 1">
+              <a:extLst>
+                <a:ext uri="{FF2B5EF4-FFF2-40B4-BE49-F238E27FC236}">
+                  <a16:creationId xmlns:a16="http://schemas.microsoft.com/office/drawing/2014/main" id="{2B41EC4E-43B0-F23C-FA5C-9851B7DAC15E}"/>
+                </a:ext>
+              </a:extLst>
+            </p:cNvPr>
+            <p:cNvSpPr txBox="1"/>
+            <p:nvPr/>
+          </p:nvSpPr>
+          <p:spPr>
+            <a:xfrm>
+              <a:off x="6429800" y="2085094"/>
+              <a:ext cx="1281880" cy="369332"/>
+            </a:xfrm>
+            <a:prstGeom prst="rect">
+              <a:avLst/>
+            </a:prstGeom>
+            <a:noFill/>
+          </p:spPr>
+          <p:txBody>
+            <a:bodyPr wrap="square" rtlCol="0">
+              <a:spAutoFit/>
+            </a:bodyPr>
+            <a:lstStyle/>
+            <a:p>
+              <a:r>
+                <a:rPr lang="fr-FR" dirty="0"/>
+                <a:t>descendre</a:t>
+              </a:r>
+            </a:p>
+          </p:txBody>
+        </p:sp>
+        <p:sp>
+          <p:nvSpPr>
+            <p:cNvPr id="3" name="ZoneTexte 2">
+              <a:extLst>
+                <a:ext uri="{FF2B5EF4-FFF2-40B4-BE49-F238E27FC236}">
+                  <a16:creationId xmlns:a16="http://schemas.microsoft.com/office/drawing/2014/main" id="{C241D260-5FD3-DEEA-EA1A-1357F1CB1CBE}"/>
+                </a:ext>
+              </a:extLst>
+            </p:cNvPr>
+            <p:cNvSpPr txBox="1"/>
+            <p:nvPr/>
+          </p:nvSpPr>
+          <p:spPr>
+            <a:xfrm>
+              <a:off x="5627388" y="4750267"/>
+              <a:ext cx="1106905" cy="369332"/>
+            </a:xfrm>
+            <a:prstGeom prst="rect">
+              <a:avLst/>
+            </a:prstGeom>
+            <a:noFill/>
+          </p:spPr>
+          <p:txBody>
+            <a:bodyPr wrap="square" rtlCol="0">
+              <a:spAutoFit/>
+            </a:bodyPr>
+            <a:lstStyle/>
+            <a:p>
+              <a:r>
+                <a:rPr lang="fr-FR" dirty="0"/>
+                <a:t>monter</a:t>
+              </a:r>
+            </a:p>
+          </p:txBody>
+        </p:sp>
+        <p:sp>
+          <p:nvSpPr>
+            <p:cNvPr id="6" name="ZoneTexte 5">
+              <a:extLst>
+                <a:ext uri="{FF2B5EF4-FFF2-40B4-BE49-F238E27FC236}">
+                  <a16:creationId xmlns:a16="http://schemas.microsoft.com/office/drawing/2014/main" id="{D793CF78-02B1-D579-AB26-B381E646EE46}"/>
+                </a:ext>
+              </a:extLst>
+            </p:cNvPr>
+            <p:cNvSpPr txBox="1"/>
+            <p:nvPr/>
+          </p:nvSpPr>
+          <p:spPr>
+            <a:xfrm>
+              <a:off x="6584677" y="2799419"/>
+              <a:ext cx="1414862" cy="338554"/>
+            </a:xfrm>
+            <a:prstGeom prst="rect">
+              <a:avLst/>
+            </a:prstGeom>
+            <a:noFill/>
+          </p:spPr>
+          <p:txBody>
+            <a:bodyPr wrap="square" rtlCol="0">
+              <a:spAutoFit/>
+            </a:bodyPr>
+            <a:lstStyle/>
+            <a:p>
+              <a:r>
+                <a:rPr lang="fr-FR" sz="1600" dirty="0"/>
+                <a:t>Poignet droite</a:t>
+              </a:r>
+            </a:p>
+          </p:txBody>
+        </p:sp>
+        <p:sp>
+          <p:nvSpPr>
+            <p:cNvPr id="7" name="ZoneTexte 6">
+              <a:extLst>
+                <a:ext uri="{FF2B5EF4-FFF2-40B4-BE49-F238E27FC236}">
+                  <a16:creationId xmlns:a16="http://schemas.microsoft.com/office/drawing/2014/main" id="{3C299A0E-199A-CA63-921D-8596C2D50B51}"/>
+                </a:ext>
+              </a:extLst>
+            </p:cNvPr>
+            <p:cNvSpPr txBox="1"/>
+            <p:nvPr/>
+          </p:nvSpPr>
+          <p:spPr>
+            <a:xfrm>
+              <a:off x="4150273" y="2812743"/>
+              <a:ext cx="1681813" cy="338554"/>
+            </a:xfrm>
+            <a:prstGeom prst="rect">
+              <a:avLst/>
+            </a:prstGeom>
+            <a:noFill/>
+          </p:spPr>
+          <p:txBody>
+            <a:bodyPr wrap="square" rtlCol="0">
+              <a:spAutoFit/>
+            </a:bodyPr>
+            <a:lstStyle/>
+            <a:p>
+              <a:r>
+                <a:rPr lang="fr-FR" sz="1600" dirty="0"/>
+                <a:t>Poignet gauche</a:t>
+              </a:r>
+            </a:p>
+          </p:txBody>
+        </p:sp>
+        <p:sp>
+          <p:nvSpPr>
+            <p:cNvPr id="30" name="Rectangle 29">
+              <a:extLst>
+                <a:ext uri="{FF2B5EF4-FFF2-40B4-BE49-F238E27FC236}">
+                  <a16:creationId xmlns:a16="http://schemas.microsoft.com/office/drawing/2014/main" id="{CE8F999E-93AC-FC07-1E8C-A0CB17EE6A75}"/>
+                </a:ext>
+              </a:extLst>
+            </p:cNvPr>
+            <p:cNvSpPr/>
+            <p:nvPr/>
+          </p:nvSpPr>
+          <p:spPr>
+            <a:xfrm>
+              <a:off x="6580383" y="5632934"/>
+              <a:ext cx="1195136" cy="294640"/>
+            </a:xfrm>
+            <a:prstGeom prst="rect">
+              <a:avLst/>
+            </a:prstGeom>
+            <a:solidFill>
+              <a:srgbClr val="7030A0"/>
+            </a:solidFill>
+            <a:ln>
+              <a:noFill/>
+            </a:ln>
+          </p:spPr>
+          <p:style>
+            <a:lnRef idx="2">
+              <a:schemeClr val="accent1">
+                <a:shade val="15000"/>
+              </a:schemeClr>
+            </a:lnRef>
+            <a:fillRef idx="1">
+              <a:schemeClr val="accent1"/>
+            </a:fillRef>
+            <a:effectRef idx="0">
+              <a:schemeClr val="accent1"/>
+            </a:effectRef>
+            <a:fontRef idx="minor">
+              <a:schemeClr val="lt1"/>
+            </a:fontRef>
+          </p:style>
+          <p:txBody>
+            <a:bodyPr rtlCol="0" anchor="ctr"/>
+            <a:lstStyle/>
+            <a:p>
+              <a:pPr algn="ctr"/>
+              <a:endParaRPr lang="fr-FR" dirty="0"/>
+            </a:p>
+          </p:txBody>
+        </p:sp>
+      </p:grpSp>
+      <p:grpSp>
+        <p:nvGrpSpPr>
+          <p:cNvPr id="35" name="Groupe 34">
+            <a:extLst>
+              <a:ext uri="{FF2B5EF4-FFF2-40B4-BE49-F238E27FC236}">
+                <a16:creationId xmlns:a16="http://schemas.microsoft.com/office/drawing/2014/main" id="{3DB283C3-584A-36FC-93BE-89A113CDEE97}"/>
+              </a:ext>
+            </a:extLst>
+          </p:cNvPr>
+          <p:cNvGrpSpPr/>
+          <p:nvPr/>
+        </p:nvGrpSpPr>
+        <p:grpSpPr>
+          <a:xfrm>
+            <a:off x="8093386" y="5062831"/>
+            <a:ext cx="2015181" cy="1472781"/>
+            <a:chOff x="8472768" y="5363918"/>
+            <a:chExt cx="2015181" cy="1472781"/>
+          </a:xfrm>
+        </p:grpSpPr>
+        <p:sp>
+          <p:nvSpPr>
+            <p:cNvPr id="29" name="Flèche : double flèche verticale 28">
+              <a:extLst>
+                <a:ext uri="{FF2B5EF4-FFF2-40B4-BE49-F238E27FC236}">
+                  <a16:creationId xmlns:a16="http://schemas.microsoft.com/office/drawing/2014/main" id="{35230433-848C-E6F9-06BA-1BF7CC5E5065}"/>
+                </a:ext>
+              </a:extLst>
+            </p:cNvPr>
+            <p:cNvSpPr/>
+            <p:nvPr/>
+          </p:nvSpPr>
+          <p:spPr>
+            <a:xfrm>
+              <a:off x="8533728" y="5699291"/>
+              <a:ext cx="176634" cy="808716"/>
+            </a:xfrm>
+            <a:prstGeom prst="upDownArrow">
+              <a:avLst/>
+            </a:prstGeom>
+            <a:solidFill>
+              <a:srgbClr val="7030A0"/>
+            </a:solidFill>
+            <a:ln>
+              <a:noFill/>
+            </a:ln>
+          </p:spPr>
+          <p:style>
+            <a:lnRef idx="2">
+              <a:schemeClr val="accent1">
+                <a:shade val="15000"/>
+              </a:schemeClr>
+            </a:lnRef>
+            <a:fillRef idx="1">
+              <a:schemeClr val="accent1"/>
+            </a:fillRef>
+            <a:effectRef idx="0">
+              <a:schemeClr val="accent1"/>
+            </a:effectRef>
+            <a:fontRef idx="minor">
+              <a:schemeClr val="lt1"/>
+            </a:fontRef>
+          </p:style>
+          <p:txBody>
+            <a:bodyPr rtlCol="0" anchor="ctr"/>
+            <a:lstStyle/>
+            <a:p>
+              <a:pPr algn="ctr"/>
+              <a:endParaRPr lang="fr-FR"/>
+            </a:p>
+          </p:txBody>
+        </p:sp>
+        <p:sp>
+          <p:nvSpPr>
+            <p:cNvPr id="32" name="ZoneTexte 31">
+              <a:extLst>
+                <a:ext uri="{FF2B5EF4-FFF2-40B4-BE49-F238E27FC236}">
+                  <a16:creationId xmlns:a16="http://schemas.microsoft.com/office/drawing/2014/main" id="{41C479D5-29A9-FB67-70F6-E06D7A8CE804}"/>
+                </a:ext>
+              </a:extLst>
+            </p:cNvPr>
+            <p:cNvSpPr txBox="1"/>
+            <p:nvPr/>
+          </p:nvSpPr>
+          <p:spPr>
+            <a:xfrm>
+              <a:off x="8472768" y="6467367"/>
+              <a:ext cx="291430" cy="369332"/>
+            </a:xfrm>
+            <a:prstGeom prst="rect">
+              <a:avLst/>
+            </a:prstGeom>
+            <a:noFill/>
+          </p:spPr>
+          <p:txBody>
+            <a:bodyPr wrap="square" rtlCol="0">
+              <a:spAutoFit/>
+            </a:bodyPr>
+            <a:lstStyle/>
+            <a:p>
+              <a:r>
+                <a:rPr lang="fr-FR" dirty="0">
+                  <a:solidFill>
+                    <a:srgbClr val="7030A0"/>
+                  </a:solidFill>
+                </a:rPr>
+                <a:t>1</a:t>
+              </a:r>
+            </a:p>
+          </p:txBody>
+        </p:sp>
+        <p:sp>
+          <p:nvSpPr>
+            <p:cNvPr id="33" name="ZoneTexte 32">
+              <a:extLst>
+                <a:ext uri="{FF2B5EF4-FFF2-40B4-BE49-F238E27FC236}">
+                  <a16:creationId xmlns:a16="http://schemas.microsoft.com/office/drawing/2014/main" id="{BAC99961-001F-60A8-1B00-A999E79AAA7A}"/>
+                </a:ext>
+              </a:extLst>
+            </p:cNvPr>
+            <p:cNvSpPr txBox="1"/>
+            <p:nvPr/>
+          </p:nvSpPr>
+          <p:spPr>
+            <a:xfrm>
+              <a:off x="8472768" y="5363918"/>
+              <a:ext cx="409168" cy="369332"/>
+            </a:xfrm>
+            <a:prstGeom prst="rect">
+              <a:avLst/>
+            </a:prstGeom>
+            <a:noFill/>
+          </p:spPr>
+          <p:txBody>
+            <a:bodyPr wrap="square" rtlCol="0">
+              <a:spAutoFit/>
+            </a:bodyPr>
+            <a:lstStyle/>
+            <a:p>
+              <a:r>
+                <a:rPr lang="fr-FR" dirty="0">
+                  <a:solidFill>
+                    <a:srgbClr val="7030A0"/>
+                  </a:solidFill>
+                </a:rPr>
+                <a:t>0</a:t>
+              </a:r>
+            </a:p>
+          </p:txBody>
+        </p:sp>
+        <p:sp>
+          <p:nvSpPr>
+            <p:cNvPr id="34" name="ZoneTexte 33">
+              <a:extLst>
+                <a:ext uri="{FF2B5EF4-FFF2-40B4-BE49-F238E27FC236}">
+                  <a16:creationId xmlns:a16="http://schemas.microsoft.com/office/drawing/2014/main" id="{705F165E-D2F7-10BF-205C-F1306BB77607}"/>
+                </a:ext>
+              </a:extLst>
+            </p:cNvPr>
+            <p:cNvSpPr txBox="1"/>
+            <p:nvPr/>
+          </p:nvSpPr>
+          <p:spPr>
+            <a:xfrm>
+              <a:off x="8738611" y="5883020"/>
+              <a:ext cx="1749338" cy="369332"/>
+            </a:xfrm>
+            <a:prstGeom prst="rect">
+              <a:avLst/>
+            </a:prstGeom>
+            <a:noFill/>
+          </p:spPr>
+          <p:txBody>
+            <a:bodyPr wrap="square" rtlCol="0">
+              <a:spAutoFit/>
+            </a:bodyPr>
+            <a:lstStyle/>
+            <a:p>
+              <a:r>
+                <a:rPr lang="fr-FR" dirty="0">
+                  <a:solidFill>
+                    <a:srgbClr val="7030A0"/>
+                  </a:solidFill>
+                </a:rPr>
+                <a:t>Ouverture pince</a:t>
+              </a:r>
+            </a:p>
+          </p:txBody>
+        </p:sp>
+      </p:grpSp>
+    </p:spTree>
+    <p:extLst>
+      <p:ext uri="{BB962C8B-B14F-4D97-AF65-F5344CB8AC3E}">
+        <p14:creationId xmlns:p14="http://schemas.microsoft.com/office/powerpoint/2010/main" val="1618966375"/>
+      </p:ext>
+    </p:extLst>
+  </p:cSld>
+  <p:clrMapOvr>
+    <a:masterClrMapping/>
+  </p:clrMapOvr>
+</p:sld>
+</file>
+
+<file path=ppt/slides/slide3.xml><?xml version="1.0" encoding="utf-8"?>
+<p:sld xmlns:a="http://schemas.openxmlformats.org/drawingml/2006/main" xmlns:r="http://schemas.openxmlformats.org/officeDocument/2006/relationships" xmlns:p="http://schemas.openxmlformats.org/presentationml/2006/main">
+  <p:cSld>
+    <p:spTree>
+      <p:nvGrpSpPr>
         <p:cNvPr id="1" name=""/>
         <p:cNvGrpSpPr/>
         <p:nvPr/>
@@ -9736,6 +11631,1933 @@
 </p:sld>
 </file>
 
+<file path=ppt/slides/slide4.xml><?xml version="1.0" encoding="utf-8"?>
+<p:sld xmlns:a="http://schemas.openxmlformats.org/drawingml/2006/main" xmlns:r="http://schemas.openxmlformats.org/officeDocument/2006/relationships" xmlns:p="http://schemas.openxmlformats.org/presentationml/2006/main">
+  <p:cSld>
+    <p:spTree>
+      <p:nvGrpSpPr>
+        <p:cNvPr id="1" name="">
+          <a:extLst>
+            <a:ext uri="{FF2B5EF4-FFF2-40B4-BE49-F238E27FC236}">
+              <a16:creationId xmlns:a16="http://schemas.microsoft.com/office/drawing/2014/main" id="{DFFBC469-F550-BD00-F188-D4A6AF702324}"/>
+            </a:ext>
+          </a:extLst>
+        </p:cNvPr>
+        <p:cNvGrpSpPr/>
+        <p:nvPr/>
+      </p:nvGrpSpPr>
+      <p:grpSpPr>
+        <a:xfrm>
+          <a:off x="0" y="0"/>
+          <a:ext cx="0" cy="0"/>
+          <a:chOff x="0" y="0"/>
+          <a:chExt cx="0" cy="0"/>
+        </a:xfrm>
+      </p:grpSpPr>
+      <p:sp>
+        <p:nvSpPr>
+          <p:cNvPr id="4" name="ZoneTexte 3">
+            <a:extLst>
+              <a:ext uri="{FF2B5EF4-FFF2-40B4-BE49-F238E27FC236}">
+                <a16:creationId xmlns:a16="http://schemas.microsoft.com/office/drawing/2014/main" id="{6CFA2FD4-F65F-3BBA-8F12-2B2C78EDED82}"/>
+              </a:ext>
+            </a:extLst>
+          </p:cNvPr>
+          <p:cNvSpPr txBox="1"/>
+          <p:nvPr/>
+        </p:nvSpPr>
+        <p:spPr>
+          <a:xfrm>
+            <a:off x="210258" y="240237"/>
+            <a:ext cx="2707004" cy="523220"/>
+          </a:xfrm>
+          <a:prstGeom prst="rect">
+            <a:avLst/>
+          </a:prstGeom>
+          <a:noFill/>
+        </p:spPr>
+        <p:txBody>
+          <a:bodyPr wrap="square" rtlCol="0">
+            <a:spAutoFit/>
+          </a:bodyPr>
+          <a:lstStyle/>
+          <a:p>
+            <a:r>
+              <a:rPr lang="fr-FR" sz="2800" b="1" dirty="0"/>
+              <a:t>CONFIG DROITE</a:t>
+            </a:r>
+          </a:p>
+        </p:txBody>
+      </p:sp>
+      <p:graphicFrame>
+        <p:nvGraphicFramePr>
+          <p:cNvPr id="9" name="Tableau 9">
+            <a:extLst>
+              <a:ext uri="{FF2B5EF4-FFF2-40B4-BE49-F238E27FC236}">
+                <a16:creationId xmlns:a16="http://schemas.microsoft.com/office/drawing/2014/main" id="{AEA8F25E-42B6-A6CD-1872-512FF381D6A2}"/>
+              </a:ext>
+            </a:extLst>
+          </p:cNvPr>
+          <p:cNvGraphicFramePr>
+            <a:graphicFrameLocks noGrp="1"/>
+          </p:cNvGraphicFramePr>
+          <p:nvPr>
+            <p:extLst>
+              <p:ext uri="{D42A27DB-BD31-4B8C-83A1-F6EECF244321}">
+                <p14:modId xmlns:p14="http://schemas.microsoft.com/office/powerpoint/2010/main" val="2484699578"/>
+              </p:ext>
+            </p:extLst>
+          </p:nvPr>
+        </p:nvGraphicFramePr>
+        <p:xfrm>
+          <a:off x="65279" y="3500086"/>
+          <a:ext cx="3675117" cy="1101296"/>
+        </p:xfrm>
+        <a:graphic>
+          <a:graphicData uri="http://schemas.openxmlformats.org/drawingml/2006/table">
+            <a:tbl>
+              <a:tblPr firstRow="1" bandRow="1">
+                <a:tableStyleId>{2D5ABB26-0587-4C30-8999-92F81FD0307C}</a:tableStyleId>
+              </a:tblPr>
+              <a:tblGrid>
+                <a:gridCol w="1225039">
+                  <a:extLst>
+                    <a:ext uri="{9D8B030D-6E8A-4147-A177-3AD203B41FA5}">
+                      <a16:colId xmlns:a16="http://schemas.microsoft.com/office/drawing/2014/main" val="1244037658"/>
+                    </a:ext>
+                  </a:extLst>
+                </a:gridCol>
+                <a:gridCol w="1225039">
+                  <a:extLst>
+                    <a:ext uri="{9D8B030D-6E8A-4147-A177-3AD203B41FA5}">
+                      <a16:colId xmlns:a16="http://schemas.microsoft.com/office/drawing/2014/main" val="3908260985"/>
+                    </a:ext>
+                  </a:extLst>
+                </a:gridCol>
+                <a:gridCol w="1225039">
+                  <a:extLst>
+                    <a:ext uri="{9D8B030D-6E8A-4147-A177-3AD203B41FA5}">
+                      <a16:colId xmlns:a16="http://schemas.microsoft.com/office/drawing/2014/main" val="284647492"/>
+                    </a:ext>
+                  </a:extLst>
+                </a:gridCol>
+              </a:tblGrid>
+              <a:tr h="461216">
+                <a:tc>
+                  <a:txBody>
+                    <a:bodyPr/>
+                    <a:lstStyle/>
+                    <a:p>
+                      <a:r>
+                        <a:rPr lang="fr-FR" dirty="0"/>
+                        <a:t>stockage1</a:t>
+                      </a:r>
+                    </a:p>
+                  </a:txBody>
+                  <a:tcPr>
+                    <a:lnL w="12700" cap="flat" cmpd="sng" algn="ctr">
+                      <a:solidFill>
+                        <a:schemeClr val="tx1"/>
+                      </a:solidFill>
+                      <a:prstDash val="solid"/>
+                      <a:round/>
+                      <a:headEnd type="none" w="med" len="med"/>
+                      <a:tailEnd type="none" w="med" len="med"/>
+                    </a:lnL>
+                    <a:lnR w="12700" cap="flat" cmpd="sng" algn="ctr">
+                      <a:solidFill>
+                        <a:schemeClr val="tx1"/>
+                      </a:solidFill>
+                      <a:prstDash val="solid"/>
+                      <a:round/>
+                      <a:headEnd type="none" w="med" len="med"/>
+                      <a:tailEnd type="none" w="med" len="med"/>
+                    </a:lnR>
+                    <a:lnT w="12700" cap="flat" cmpd="sng" algn="ctr">
+                      <a:solidFill>
+                        <a:schemeClr val="tx1"/>
+                      </a:solidFill>
+                      <a:prstDash val="solid"/>
+                      <a:round/>
+                      <a:headEnd type="none" w="med" len="med"/>
+                      <a:tailEnd type="none" w="med" len="med"/>
+                    </a:lnT>
+                    <a:lnB w="12700" cap="flat" cmpd="sng" algn="ctr">
+                      <a:solidFill>
+                        <a:schemeClr val="tx1"/>
+                      </a:solidFill>
+                      <a:prstDash val="solid"/>
+                      <a:round/>
+                      <a:headEnd type="none" w="med" len="med"/>
+                      <a:tailEnd type="none" w="med" len="med"/>
+                    </a:lnB>
+                    <a:cell3D prstMaterial="dkEdge">
+                      <a:bevel/>
+                      <a:lightRig rig="flood" dir="t"/>
+                    </a:cell3D>
+                  </a:tcPr>
+                </a:tc>
+                <a:tc>
+                  <a:txBody>
+                    <a:bodyPr/>
+                    <a:lstStyle/>
+                    <a:p>
+                      <a:r>
+                        <a:rPr lang="fr-FR" dirty="0"/>
+                        <a:t>stockage2</a:t>
+                      </a:r>
+                    </a:p>
+                  </a:txBody>
+                  <a:tcPr>
+                    <a:lnL w="12700" cap="flat" cmpd="sng" algn="ctr">
+                      <a:solidFill>
+                        <a:schemeClr val="tx1"/>
+                      </a:solidFill>
+                      <a:prstDash val="solid"/>
+                      <a:round/>
+                      <a:headEnd type="none" w="med" len="med"/>
+                      <a:tailEnd type="none" w="med" len="med"/>
+                    </a:lnL>
+                    <a:lnR w="12700" cap="flat" cmpd="sng" algn="ctr">
+                      <a:solidFill>
+                        <a:schemeClr val="tx1"/>
+                      </a:solidFill>
+                      <a:prstDash val="solid"/>
+                      <a:round/>
+                      <a:headEnd type="none" w="med" len="med"/>
+                      <a:tailEnd type="none" w="med" len="med"/>
+                    </a:lnR>
+                    <a:lnT w="12700" cap="flat" cmpd="sng" algn="ctr">
+                      <a:solidFill>
+                        <a:schemeClr val="tx1"/>
+                      </a:solidFill>
+                      <a:prstDash val="solid"/>
+                      <a:round/>
+                      <a:headEnd type="none" w="med" len="med"/>
+                      <a:tailEnd type="none" w="med" len="med"/>
+                    </a:lnT>
+                    <a:lnB w="12700" cap="flat" cmpd="sng" algn="ctr">
+                      <a:solidFill>
+                        <a:schemeClr val="tx1"/>
+                      </a:solidFill>
+                      <a:prstDash val="solid"/>
+                      <a:round/>
+                      <a:headEnd type="none" w="med" len="med"/>
+                      <a:tailEnd type="none" w="med" len="med"/>
+                    </a:lnB>
+                    <a:cell3D prstMaterial="dkEdge">
+                      <a:bevel/>
+                      <a:lightRig rig="flood" dir="t"/>
+                    </a:cell3D>
+                  </a:tcPr>
+                </a:tc>
+                <a:tc>
+                  <a:txBody>
+                    <a:bodyPr/>
+                    <a:lstStyle/>
+                    <a:p>
+                      <a:r>
+                        <a:rPr lang="fr-FR" dirty="0"/>
+                        <a:t>stockage3</a:t>
+                      </a:r>
+                    </a:p>
+                  </a:txBody>
+                  <a:tcPr>
+                    <a:lnL w="12700" cap="flat" cmpd="sng" algn="ctr">
+                      <a:solidFill>
+                        <a:schemeClr val="tx1"/>
+                      </a:solidFill>
+                      <a:prstDash val="solid"/>
+                      <a:round/>
+                      <a:headEnd type="none" w="med" len="med"/>
+                      <a:tailEnd type="none" w="med" len="med"/>
+                    </a:lnL>
+                    <a:lnR w="12700" cap="flat" cmpd="sng" algn="ctr">
+                      <a:solidFill>
+                        <a:schemeClr val="tx1"/>
+                      </a:solidFill>
+                      <a:prstDash val="solid"/>
+                      <a:round/>
+                      <a:headEnd type="none" w="med" len="med"/>
+                      <a:tailEnd type="none" w="med" len="med"/>
+                    </a:lnR>
+                    <a:lnT w="12700" cap="flat" cmpd="sng" algn="ctr">
+                      <a:solidFill>
+                        <a:schemeClr val="tx1"/>
+                      </a:solidFill>
+                      <a:prstDash val="solid"/>
+                      <a:round/>
+                      <a:headEnd type="none" w="med" len="med"/>
+                      <a:tailEnd type="none" w="med" len="med"/>
+                    </a:lnT>
+                    <a:lnB w="12700" cap="flat" cmpd="sng" algn="ctr">
+                      <a:solidFill>
+                        <a:schemeClr val="tx1"/>
+                      </a:solidFill>
+                      <a:prstDash val="solid"/>
+                      <a:round/>
+                      <a:headEnd type="none" w="med" len="med"/>
+                      <a:tailEnd type="none" w="med" len="med"/>
+                    </a:lnB>
+                    <a:cell3D prstMaterial="dkEdge">
+                      <a:bevel/>
+                      <a:lightRig rig="flood" dir="t"/>
+                    </a:cell3D>
+                  </a:tcPr>
+                </a:tc>
+                <a:extLst>
+                  <a:ext uri="{0D108BD9-81ED-4DB2-BD59-A6C34878D82A}">
+                    <a16:rowId xmlns:a16="http://schemas.microsoft.com/office/drawing/2014/main" val="980658539"/>
+                  </a:ext>
+                </a:extLst>
+              </a:tr>
+              <a:tr h="461216">
+                <a:tc>
+                  <a:txBody>
+                    <a:bodyPr/>
+                    <a:lstStyle/>
+                    <a:p>
+                      <a:pPr marL="0" marR="0" lvl="0" indent="0" algn="l" defTabSz="914400" rtl="0" eaLnBrk="1" fontAlgn="auto" latinLnBrk="0" hangingPunct="1">
+                        <a:lnSpc>
+                          <a:spcPct val="100000"/>
+                        </a:lnSpc>
+                        <a:spcBef>
+                          <a:spcPts val="0"/>
+                        </a:spcBef>
+                        <a:spcAft>
+                          <a:spcPts val="0"/>
+                        </a:spcAft>
+                        <a:buClrTx/>
+                        <a:buSzTx/>
+                        <a:buFontTx/>
+                        <a:buNone/>
+                        <a:tabLst/>
+                        <a:defRPr/>
+                      </a:pPr>
+                      <a:r>
+                        <a:rPr lang="fr-FR" dirty="0"/>
+                        <a:t>Macro-frottis</a:t>
+                      </a:r>
+                    </a:p>
+                  </a:txBody>
+                  <a:tcPr>
+                    <a:lnL w="12700" cap="flat" cmpd="sng" algn="ctr">
+                      <a:solidFill>
+                        <a:schemeClr val="tx1"/>
+                      </a:solidFill>
+                      <a:prstDash val="solid"/>
+                      <a:round/>
+                      <a:headEnd type="none" w="med" len="med"/>
+                      <a:tailEnd type="none" w="med" len="med"/>
+                    </a:lnL>
+                    <a:lnR w="12700" cap="flat" cmpd="sng" algn="ctr">
+                      <a:solidFill>
+                        <a:schemeClr val="tx1"/>
+                      </a:solidFill>
+                      <a:prstDash val="solid"/>
+                      <a:round/>
+                      <a:headEnd type="none" w="med" len="med"/>
+                      <a:tailEnd type="none" w="med" len="med"/>
+                    </a:lnR>
+                    <a:lnT w="12700" cap="flat" cmpd="sng" algn="ctr">
+                      <a:solidFill>
+                        <a:schemeClr val="tx1"/>
+                      </a:solidFill>
+                      <a:prstDash val="solid"/>
+                      <a:round/>
+                      <a:headEnd type="none" w="med" len="med"/>
+                      <a:tailEnd type="none" w="med" len="med"/>
+                    </a:lnT>
+                    <a:lnB w="12700" cap="flat" cmpd="sng" algn="ctr">
+                      <a:solidFill>
+                        <a:schemeClr val="tx1"/>
+                      </a:solidFill>
+                      <a:prstDash val="solid"/>
+                      <a:round/>
+                      <a:headEnd type="none" w="med" len="med"/>
+                      <a:tailEnd type="none" w="med" len="med"/>
+                    </a:lnB>
+                    <a:cell3D prstMaterial="dkEdge">
+                      <a:bevel/>
+                      <a:lightRig rig="flood" dir="t"/>
+                    </a:cell3D>
+                  </a:tcPr>
+                </a:tc>
+                <a:tc>
+                  <a:txBody>
+                    <a:bodyPr/>
+                    <a:lstStyle/>
+                    <a:p>
+                      <a:r>
+                        <a:rPr lang="fr-FR" dirty="0"/>
+                        <a:t>Position zéro</a:t>
+                      </a:r>
+                    </a:p>
+                  </a:txBody>
+                  <a:tcPr>
+                    <a:lnL w="12700" cap="flat" cmpd="sng" algn="ctr">
+                      <a:solidFill>
+                        <a:schemeClr val="tx1"/>
+                      </a:solidFill>
+                      <a:prstDash val="solid"/>
+                      <a:round/>
+                      <a:headEnd type="none" w="med" len="med"/>
+                      <a:tailEnd type="none" w="med" len="med"/>
+                    </a:lnL>
+                    <a:lnR w="12700" cap="flat" cmpd="sng" algn="ctr">
+                      <a:solidFill>
+                        <a:schemeClr val="tx1"/>
+                      </a:solidFill>
+                      <a:prstDash val="solid"/>
+                      <a:round/>
+                      <a:headEnd type="none" w="med" len="med"/>
+                      <a:tailEnd type="none" w="med" len="med"/>
+                    </a:lnR>
+                    <a:lnT w="12700" cap="flat" cmpd="sng" algn="ctr">
+                      <a:solidFill>
+                        <a:schemeClr val="tx1"/>
+                      </a:solidFill>
+                      <a:prstDash val="solid"/>
+                      <a:round/>
+                      <a:headEnd type="none" w="med" len="med"/>
+                      <a:tailEnd type="none" w="med" len="med"/>
+                    </a:lnT>
+                    <a:lnB w="12700" cap="flat" cmpd="sng" algn="ctr">
+                      <a:solidFill>
+                        <a:schemeClr val="tx1"/>
+                      </a:solidFill>
+                      <a:prstDash val="solid"/>
+                      <a:round/>
+                      <a:headEnd type="none" w="med" len="med"/>
+                      <a:tailEnd type="none" w="med" len="med"/>
+                    </a:lnB>
+                    <a:cell3D prstMaterial="dkEdge">
+                      <a:bevel/>
+                      <a:lightRig rig="flood" dir="t"/>
+                    </a:cell3D>
+                  </a:tcPr>
+                </a:tc>
+                <a:tc>
+                  <a:txBody>
+                    <a:bodyPr/>
+                    <a:lstStyle/>
+                    <a:p>
+                      <a:endParaRPr lang="fr-FR" dirty="0"/>
+                    </a:p>
+                  </a:txBody>
+                  <a:tcPr>
+                    <a:lnL w="12700" cap="flat" cmpd="sng" algn="ctr">
+                      <a:solidFill>
+                        <a:schemeClr val="tx1"/>
+                      </a:solidFill>
+                      <a:prstDash val="solid"/>
+                      <a:round/>
+                      <a:headEnd type="none" w="med" len="med"/>
+                      <a:tailEnd type="none" w="med" len="med"/>
+                    </a:lnL>
+                    <a:lnR w="12700" cap="flat" cmpd="sng" algn="ctr">
+                      <a:solidFill>
+                        <a:schemeClr val="tx1"/>
+                      </a:solidFill>
+                      <a:prstDash val="solid"/>
+                      <a:round/>
+                      <a:headEnd type="none" w="med" len="med"/>
+                      <a:tailEnd type="none" w="med" len="med"/>
+                    </a:lnR>
+                    <a:lnT w="12700" cap="flat" cmpd="sng" algn="ctr">
+                      <a:solidFill>
+                        <a:schemeClr val="tx1"/>
+                      </a:solidFill>
+                      <a:prstDash val="solid"/>
+                      <a:round/>
+                      <a:headEnd type="none" w="med" len="med"/>
+                      <a:tailEnd type="none" w="med" len="med"/>
+                    </a:lnT>
+                    <a:lnB w="12700" cap="flat" cmpd="sng" algn="ctr">
+                      <a:solidFill>
+                        <a:schemeClr val="tx1"/>
+                      </a:solidFill>
+                      <a:prstDash val="solid"/>
+                      <a:round/>
+                      <a:headEnd type="none" w="med" len="med"/>
+                      <a:tailEnd type="none" w="med" len="med"/>
+                    </a:lnB>
+                    <a:cell3D prstMaterial="dkEdge">
+                      <a:bevel/>
+                      <a:lightRig rig="flood" dir="t"/>
+                    </a:cell3D>
+                  </a:tcPr>
+                </a:tc>
+                <a:extLst>
+                  <a:ext uri="{0D108BD9-81ED-4DB2-BD59-A6C34878D82A}">
+                    <a16:rowId xmlns:a16="http://schemas.microsoft.com/office/drawing/2014/main" val="4182417412"/>
+                  </a:ext>
+                </a:extLst>
+              </a:tr>
+            </a:tbl>
+          </a:graphicData>
+        </a:graphic>
+      </p:graphicFrame>
+      <p:graphicFrame>
+        <p:nvGraphicFramePr>
+          <p:cNvPr id="11" name="Tableau 9">
+            <a:extLst>
+              <a:ext uri="{FF2B5EF4-FFF2-40B4-BE49-F238E27FC236}">
+                <a16:creationId xmlns:a16="http://schemas.microsoft.com/office/drawing/2014/main" id="{76DC472F-452A-BC64-F858-1B8260118216}"/>
+              </a:ext>
+            </a:extLst>
+          </p:cNvPr>
+          <p:cNvGraphicFramePr>
+            <a:graphicFrameLocks noGrp="1"/>
+          </p:cNvGraphicFramePr>
+          <p:nvPr>
+            <p:extLst>
+              <p:ext uri="{D42A27DB-BD31-4B8C-83A1-F6EECF244321}">
+                <p14:modId xmlns:p14="http://schemas.microsoft.com/office/powerpoint/2010/main" val="1903067492"/>
+              </p:ext>
+            </p:extLst>
+          </p:nvPr>
+        </p:nvGraphicFramePr>
+        <p:xfrm>
+          <a:off x="8239101" y="3534553"/>
+          <a:ext cx="3320982" cy="1101296"/>
+        </p:xfrm>
+        <a:graphic>
+          <a:graphicData uri="http://schemas.openxmlformats.org/drawingml/2006/table">
+            <a:tbl>
+              <a:tblPr firstRow="1" bandRow="1">
+                <a:tableStyleId>{2D5ABB26-0587-4C30-8999-92F81FD0307C}</a:tableStyleId>
+              </a:tblPr>
+              <a:tblGrid>
+                <a:gridCol w="1370120">
+                  <a:extLst>
+                    <a:ext uri="{9D8B030D-6E8A-4147-A177-3AD203B41FA5}">
+                      <a16:colId xmlns:a16="http://schemas.microsoft.com/office/drawing/2014/main" val="1244037658"/>
+                    </a:ext>
+                  </a:extLst>
+                </a:gridCol>
+                <a:gridCol w="962526">
+                  <a:extLst>
+                    <a:ext uri="{9D8B030D-6E8A-4147-A177-3AD203B41FA5}">
+                      <a16:colId xmlns:a16="http://schemas.microsoft.com/office/drawing/2014/main" val="3908260985"/>
+                    </a:ext>
+                  </a:extLst>
+                </a:gridCol>
+                <a:gridCol w="988336">
+                  <a:extLst>
+                    <a:ext uri="{9D8B030D-6E8A-4147-A177-3AD203B41FA5}">
+                      <a16:colId xmlns:a16="http://schemas.microsoft.com/office/drawing/2014/main" val="284647492"/>
+                    </a:ext>
+                  </a:extLst>
+                </a:gridCol>
+              </a:tblGrid>
+              <a:tr h="461216">
+                <a:tc>
+                  <a:txBody>
+                    <a:bodyPr/>
+                    <a:lstStyle/>
+                    <a:p>
+                      <a:r>
+                        <a:rPr lang="fr-FR" dirty="0"/>
+                        <a:t>outil3</a:t>
+                      </a:r>
+                    </a:p>
+                  </a:txBody>
+                  <a:tcPr>
+                    <a:lnL w="12700" cap="flat" cmpd="sng" algn="ctr">
+                      <a:solidFill>
+                        <a:schemeClr val="tx1"/>
+                      </a:solidFill>
+                      <a:prstDash val="solid"/>
+                      <a:round/>
+                      <a:headEnd type="none" w="med" len="med"/>
+                      <a:tailEnd type="none" w="med" len="med"/>
+                    </a:lnL>
+                    <a:lnR w="12700" cap="flat" cmpd="sng" algn="ctr">
+                      <a:solidFill>
+                        <a:schemeClr val="tx1"/>
+                      </a:solidFill>
+                      <a:prstDash val="solid"/>
+                      <a:round/>
+                      <a:headEnd type="none" w="med" len="med"/>
+                      <a:tailEnd type="none" w="med" len="med"/>
+                    </a:lnR>
+                    <a:lnT w="12700" cap="flat" cmpd="sng" algn="ctr">
+                      <a:solidFill>
+                        <a:schemeClr val="tx1"/>
+                      </a:solidFill>
+                      <a:prstDash val="solid"/>
+                      <a:round/>
+                      <a:headEnd type="none" w="med" len="med"/>
+                      <a:tailEnd type="none" w="med" len="med"/>
+                    </a:lnT>
+                    <a:lnB w="12700" cap="flat" cmpd="sng" algn="ctr">
+                      <a:solidFill>
+                        <a:schemeClr val="tx1"/>
+                      </a:solidFill>
+                      <a:prstDash val="solid"/>
+                      <a:round/>
+                      <a:headEnd type="none" w="med" len="med"/>
+                      <a:tailEnd type="none" w="med" len="med"/>
+                    </a:lnB>
+                    <a:cell3D prstMaterial="dkEdge">
+                      <a:bevel/>
+                      <a:lightRig rig="flood" dir="t"/>
+                    </a:cell3D>
+                  </a:tcPr>
+                </a:tc>
+                <a:tc>
+                  <a:txBody>
+                    <a:bodyPr/>
+                    <a:lstStyle/>
+                    <a:p>
+                      <a:r>
+                        <a:rPr lang="fr-FR" dirty="0"/>
+                        <a:t>outil2</a:t>
+                      </a:r>
+                    </a:p>
+                  </a:txBody>
+                  <a:tcPr>
+                    <a:lnL w="12700" cap="flat" cmpd="sng" algn="ctr">
+                      <a:solidFill>
+                        <a:schemeClr val="tx1"/>
+                      </a:solidFill>
+                      <a:prstDash val="solid"/>
+                      <a:round/>
+                      <a:headEnd type="none" w="med" len="med"/>
+                      <a:tailEnd type="none" w="med" len="med"/>
+                    </a:lnL>
+                    <a:lnR w="12700" cap="flat" cmpd="sng" algn="ctr">
+                      <a:solidFill>
+                        <a:schemeClr val="tx1"/>
+                      </a:solidFill>
+                      <a:prstDash val="solid"/>
+                      <a:round/>
+                      <a:headEnd type="none" w="med" len="med"/>
+                      <a:tailEnd type="none" w="med" len="med"/>
+                    </a:lnR>
+                    <a:lnT w="12700" cap="flat" cmpd="sng" algn="ctr">
+                      <a:solidFill>
+                        <a:schemeClr val="tx1"/>
+                      </a:solidFill>
+                      <a:prstDash val="solid"/>
+                      <a:round/>
+                      <a:headEnd type="none" w="med" len="med"/>
+                      <a:tailEnd type="none" w="med" len="med"/>
+                    </a:lnT>
+                    <a:lnB w="12700" cap="flat" cmpd="sng" algn="ctr">
+                      <a:solidFill>
+                        <a:schemeClr val="tx1"/>
+                      </a:solidFill>
+                      <a:prstDash val="solid"/>
+                      <a:round/>
+                      <a:headEnd type="none" w="med" len="med"/>
+                      <a:tailEnd type="none" w="med" len="med"/>
+                    </a:lnB>
+                    <a:cell3D prstMaterial="dkEdge">
+                      <a:bevel/>
+                      <a:lightRig rig="flood" dir="t"/>
+                    </a:cell3D>
+                  </a:tcPr>
+                </a:tc>
+                <a:tc>
+                  <a:txBody>
+                    <a:bodyPr/>
+                    <a:lstStyle/>
+                    <a:p>
+                      <a:r>
+                        <a:rPr lang="fr-FR" dirty="0"/>
+                        <a:t>outil1</a:t>
+                      </a:r>
+                    </a:p>
+                  </a:txBody>
+                  <a:tcPr>
+                    <a:lnL w="12700" cap="flat" cmpd="sng" algn="ctr">
+                      <a:solidFill>
+                        <a:schemeClr val="tx1"/>
+                      </a:solidFill>
+                      <a:prstDash val="solid"/>
+                      <a:round/>
+                      <a:headEnd type="none" w="med" len="med"/>
+                      <a:tailEnd type="none" w="med" len="med"/>
+                    </a:lnL>
+                    <a:lnR w="12700" cap="flat" cmpd="sng" algn="ctr">
+                      <a:solidFill>
+                        <a:schemeClr val="tx1"/>
+                      </a:solidFill>
+                      <a:prstDash val="solid"/>
+                      <a:round/>
+                      <a:headEnd type="none" w="med" len="med"/>
+                      <a:tailEnd type="none" w="med" len="med"/>
+                    </a:lnR>
+                    <a:lnT w="12700" cap="flat" cmpd="sng" algn="ctr">
+                      <a:solidFill>
+                        <a:schemeClr val="tx1"/>
+                      </a:solidFill>
+                      <a:prstDash val="solid"/>
+                      <a:round/>
+                      <a:headEnd type="none" w="med" len="med"/>
+                      <a:tailEnd type="none" w="med" len="med"/>
+                    </a:lnT>
+                    <a:lnB w="12700" cap="flat" cmpd="sng" algn="ctr">
+                      <a:solidFill>
+                        <a:schemeClr val="tx1"/>
+                      </a:solidFill>
+                      <a:prstDash val="solid"/>
+                      <a:round/>
+                      <a:headEnd type="none" w="med" len="med"/>
+                      <a:tailEnd type="none" w="med" len="med"/>
+                    </a:lnB>
+                    <a:cell3D prstMaterial="dkEdge">
+                      <a:bevel/>
+                      <a:lightRig rig="flood" dir="t"/>
+                    </a:cell3D>
+                  </a:tcPr>
+                </a:tc>
+                <a:extLst>
+                  <a:ext uri="{0D108BD9-81ED-4DB2-BD59-A6C34878D82A}">
+                    <a16:rowId xmlns:a16="http://schemas.microsoft.com/office/drawing/2014/main" val="980658539"/>
+                  </a:ext>
+                </a:extLst>
+              </a:tr>
+              <a:tr h="461216">
+                <a:tc>
+                  <a:txBody>
+                    <a:bodyPr/>
+                    <a:lstStyle/>
+                    <a:p>
+                      <a:pPr marL="0" marR="0" lvl="0" indent="0" algn="l" defTabSz="914400" rtl="0" eaLnBrk="1" fontAlgn="auto" latinLnBrk="0" hangingPunct="1">
+                        <a:lnSpc>
+                          <a:spcPct val="100000"/>
+                        </a:lnSpc>
+                        <a:spcBef>
+                          <a:spcPts val="0"/>
+                        </a:spcBef>
+                        <a:spcAft>
+                          <a:spcPts val="0"/>
+                        </a:spcAft>
+                        <a:buClrTx/>
+                        <a:buSzTx/>
+                        <a:buFontTx/>
+                        <a:buNone/>
+                        <a:tabLst/>
+                        <a:defRPr/>
+                      </a:pPr>
+                      <a:r>
+                        <a:rPr lang="fr-FR" sz="1800" dirty="0"/>
+                        <a:t>Mode prélèvement</a:t>
+                      </a:r>
+                    </a:p>
+                  </a:txBody>
+                  <a:tcPr>
+                    <a:lnL w="12700" cap="flat" cmpd="sng" algn="ctr">
+                      <a:solidFill>
+                        <a:schemeClr val="tx1"/>
+                      </a:solidFill>
+                      <a:prstDash val="solid"/>
+                      <a:round/>
+                      <a:headEnd type="none" w="med" len="med"/>
+                      <a:tailEnd type="none" w="med" len="med"/>
+                    </a:lnL>
+                    <a:lnR w="12700" cap="flat" cmpd="sng" algn="ctr">
+                      <a:solidFill>
+                        <a:schemeClr val="tx1"/>
+                      </a:solidFill>
+                      <a:prstDash val="solid"/>
+                      <a:round/>
+                      <a:headEnd type="none" w="med" len="med"/>
+                      <a:tailEnd type="none" w="med" len="med"/>
+                    </a:lnR>
+                    <a:lnT w="12700" cap="flat" cmpd="sng" algn="ctr">
+                      <a:solidFill>
+                        <a:schemeClr val="tx1"/>
+                      </a:solidFill>
+                      <a:prstDash val="solid"/>
+                      <a:round/>
+                      <a:headEnd type="none" w="med" len="med"/>
+                      <a:tailEnd type="none" w="med" len="med"/>
+                    </a:lnT>
+                    <a:lnB w="12700" cap="flat" cmpd="sng" algn="ctr">
+                      <a:solidFill>
+                        <a:schemeClr val="tx1"/>
+                      </a:solidFill>
+                      <a:prstDash val="solid"/>
+                      <a:round/>
+                      <a:headEnd type="none" w="med" len="med"/>
+                      <a:tailEnd type="none" w="med" len="med"/>
+                    </a:lnB>
+                    <a:cell3D prstMaterial="dkEdge">
+                      <a:bevel/>
+                      <a:lightRig rig="flood" dir="t"/>
+                    </a:cell3D>
+                  </a:tcPr>
+                </a:tc>
+                <a:tc>
+                  <a:txBody>
+                    <a:bodyPr/>
+                    <a:lstStyle/>
+                    <a:p>
+                      <a:endParaRPr lang="fr-FR" dirty="0"/>
+                    </a:p>
+                  </a:txBody>
+                  <a:tcPr>
+                    <a:lnL w="12700" cap="flat" cmpd="sng" algn="ctr">
+                      <a:solidFill>
+                        <a:schemeClr val="tx1"/>
+                      </a:solidFill>
+                      <a:prstDash val="solid"/>
+                      <a:round/>
+                      <a:headEnd type="none" w="med" len="med"/>
+                      <a:tailEnd type="none" w="med" len="med"/>
+                    </a:lnL>
+                    <a:lnR w="12700" cap="flat" cmpd="sng" algn="ctr">
+                      <a:solidFill>
+                        <a:schemeClr val="tx1"/>
+                      </a:solidFill>
+                      <a:prstDash val="solid"/>
+                      <a:round/>
+                      <a:headEnd type="none" w="med" len="med"/>
+                      <a:tailEnd type="none" w="med" len="med"/>
+                    </a:lnR>
+                    <a:lnT w="12700" cap="flat" cmpd="sng" algn="ctr">
+                      <a:solidFill>
+                        <a:schemeClr val="tx1"/>
+                      </a:solidFill>
+                      <a:prstDash val="solid"/>
+                      <a:round/>
+                      <a:headEnd type="none" w="med" len="med"/>
+                      <a:tailEnd type="none" w="med" len="med"/>
+                    </a:lnT>
+                    <a:lnB w="12700" cap="flat" cmpd="sng" algn="ctr">
+                      <a:solidFill>
+                        <a:schemeClr val="tx1"/>
+                      </a:solidFill>
+                      <a:prstDash val="solid"/>
+                      <a:round/>
+                      <a:headEnd type="none" w="med" len="med"/>
+                      <a:tailEnd type="none" w="med" len="med"/>
+                    </a:lnB>
+                    <a:cell3D prstMaterial="dkEdge">
+                      <a:bevel/>
+                      <a:lightRig rig="flood" dir="t"/>
+                    </a:cell3D>
+                  </a:tcPr>
+                </a:tc>
+                <a:tc>
+                  <a:txBody>
+                    <a:bodyPr/>
+                    <a:lstStyle/>
+                    <a:p>
+                      <a:r>
+                        <a:rPr lang="fr-FR" sz="1600" dirty="0"/>
+                        <a:t>éclairage</a:t>
+                      </a:r>
+                    </a:p>
+                  </a:txBody>
+                  <a:tcPr>
+                    <a:lnL w="12700" cap="flat" cmpd="sng" algn="ctr">
+                      <a:solidFill>
+                        <a:schemeClr val="tx1"/>
+                      </a:solidFill>
+                      <a:prstDash val="solid"/>
+                      <a:round/>
+                      <a:headEnd type="none" w="med" len="med"/>
+                      <a:tailEnd type="none" w="med" len="med"/>
+                    </a:lnL>
+                    <a:lnR w="12700" cap="flat" cmpd="sng" algn="ctr">
+                      <a:solidFill>
+                        <a:schemeClr val="tx1"/>
+                      </a:solidFill>
+                      <a:prstDash val="solid"/>
+                      <a:round/>
+                      <a:headEnd type="none" w="med" len="med"/>
+                      <a:tailEnd type="none" w="med" len="med"/>
+                    </a:lnR>
+                    <a:lnT w="12700" cap="flat" cmpd="sng" algn="ctr">
+                      <a:solidFill>
+                        <a:schemeClr val="tx1"/>
+                      </a:solidFill>
+                      <a:prstDash val="solid"/>
+                      <a:round/>
+                      <a:headEnd type="none" w="med" len="med"/>
+                      <a:tailEnd type="none" w="med" len="med"/>
+                    </a:lnT>
+                    <a:lnB w="12700" cap="flat" cmpd="sng" algn="ctr">
+                      <a:solidFill>
+                        <a:schemeClr val="tx1"/>
+                      </a:solidFill>
+                      <a:prstDash val="solid"/>
+                      <a:round/>
+                      <a:headEnd type="none" w="med" len="med"/>
+                      <a:tailEnd type="none" w="med" len="med"/>
+                    </a:lnB>
+                    <a:cell3D prstMaterial="dkEdge">
+                      <a:bevel/>
+                      <a:lightRig rig="flood" dir="t"/>
+                    </a:cell3D>
+                  </a:tcPr>
+                </a:tc>
+                <a:extLst>
+                  <a:ext uri="{0D108BD9-81ED-4DB2-BD59-A6C34878D82A}">
+                    <a16:rowId xmlns:a16="http://schemas.microsoft.com/office/drawing/2014/main" val="4182417412"/>
+                  </a:ext>
+                </a:extLst>
+              </a:tr>
+            </a:tbl>
+          </a:graphicData>
+        </a:graphic>
+      </p:graphicFrame>
+      <p:grpSp>
+        <p:nvGrpSpPr>
+          <p:cNvPr id="28" name="Groupe 27">
+            <a:extLst>
+              <a:ext uri="{FF2B5EF4-FFF2-40B4-BE49-F238E27FC236}">
+                <a16:creationId xmlns:a16="http://schemas.microsoft.com/office/drawing/2014/main" id="{E6856CBA-617A-59BA-C55D-5026BB42C465}"/>
+              </a:ext>
+            </a:extLst>
+          </p:cNvPr>
+          <p:cNvGrpSpPr/>
+          <p:nvPr/>
+        </p:nvGrpSpPr>
+        <p:grpSpPr>
+          <a:xfrm>
+            <a:off x="8197084" y="763457"/>
+            <a:ext cx="3529862" cy="2198417"/>
+            <a:chOff x="8547830" y="1469486"/>
+            <a:chExt cx="3529862" cy="2198417"/>
+          </a:xfrm>
+        </p:grpSpPr>
+        <p:sp>
+          <p:nvSpPr>
+            <p:cNvPr id="13" name="ZoneTexte 12">
+              <a:extLst>
+                <a:ext uri="{FF2B5EF4-FFF2-40B4-BE49-F238E27FC236}">
+                  <a16:creationId xmlns:a16="http://schemas.microsoft.com/office/drawing/2014/main" id="{3E5D44C9-10C0-6064-9FDD-51C191A6F958}"/>
+                </a:ext>
+              </a:extLst>
+            </p:cNvPr>
+            <p:cNvSpPr txBox="1"/>
+            <p:nvPr/>
+          </p:nvSpPr>
+          <p:spPr>
+            <a:xfrm>
+              <a:off x="10169886" y="2207494"/>
+              <a:ext cx="1594765" cy="369332"/>
+            </a:xfrm>
+            <a:prstGeom prst="rect">
+              <a:avLst/>
+            </a:prstGeom>
+            <a:noFill/>
+          </p:spPr>
+          <p:txBody>
+            <a:bodyPr wrap="square" rtlCol="0">
+              <a:spAutoFit/>
+            </a:bodyPr>
+            <a:lstStyle/>
+            <a:p>
+              <a:r>
+                <a:rPr lang="fr-FR" dirty="0">
+                  <a:solidFill>
+                    <a:srgbClr val="FF0000"/>
+                  </a:solidFill>
+                </a:rPr>
+                <a:t>gauche-droite</a:t>
+              </a:r>
+            </a:p>
+          </p:txBody>
+        </p:sp>
+        <p:sp>
+          <p:nvSpPr>
+            <p:cNvPr id="14" name="ZoneTexte 13">
+              <a:extLst>
+                <a:ext uri="{FF2B5EF4-FFF2-40B4-BE49-F238E27FC236}">
+                  <a16:creationId xmlns:a16="http://schemas.microsoft.com/office/drawing/2014/main" id="{CF9FDB67-1EDC-6C06-69D9-0ED08B49B64C}"/>
+                </a:ext>
+              </a:extLst>
+            </p:cNvPr>
+            <p:cNvSpPr txBox="1"/>
+            <p:nvPr/>
+          </p:nvSpPr>
+          <p:spPr>
+            <a:xfrm>
+              <a:off x="8547830" y="2477596"/>
+              <a:ext cx="462946" cy="369332"/>
+            </a:xfrm>
+            <a:prstGeom prst="rect">
+              <a:avLst/>
+            </a:prstGeom>
+            <a:noFill/>
+          </p:spPr>
+          <p:txBody>
+            <a:bodyPr wrap="square" rtlCol="0">
+              <a:spAutoFit/>
+            </a:bodyPr>
+            <a:lstStyle/>
+            <a:p>
+              <a:r>
+                <a:rPr lang="fr-FR" dirty="0">
+                  <a:solidFill>
+                    <a:srgbClr val="FF0000"/>
+                  </a:solidFill>
+                </a:rPr>
+                <a:t>-1</a:t>
+              </a:r>
+            </a:p>
+          </p:txBody>
+        </p:sp>
+        <p:sp>
+          <p:nvSpPr>
+            <p:cNvPr id="15" name="ZoneTexte 14">
+              <a:extLst>
+                <a:ext uri="{FF2B5EF4-FFF2-40B4-BE49-F238E27FC236}">
+                  <a16:creationId xmlns:a16="http://schemas.microsoft.com/office/drawing/2014/main" id="{6563DC37-F164-CFFC-8A1C-16DA21D84C81}"/>
+                </a:ext>
+              </a:extLst>
+            </p:cNvPr>
+            <p:cNvSpPr txBox="1"/>
+            <p:nvPr/>
+          </p:nvSpPr>
+          <p:spPr>
+            <a:xfrm>
+              <a:off x="10156710" y="2477596"/>
+              <a:ext cx="487941" cy="369332"/>
+            </a:xfrm>
+            <a:prstGeom prst="rect">
+              <a:avLst/>
+            </a:prstGeom>
+            <a:noFill/>
+          </p:spPr>
+          <p:txBody>
+            <a:bodyPr wrap="square" rtlCol="0">
+              <a:spAutoFit/>
+            </a:bodyPr>
+            <a:lstStyle/>
+            <a:p>
+              <a:r>
+                <a:rPr lang="fr-FR" dirty="0">
+                  <a:solidFill>
+                    <a:srgbClr val="FF0000"/>
+                  </a:solidFill>
+                </a:rPr>
+                <a:t>1</a:t>
+              </a:r>
+            </a:p>
+          </p:txBody>
+        </p:sp>
+        <p:sp>
+          <p:nvSpPr>
+            <p:cNvPr id="16" name="ZoneTexte 15">
+              <a:extLst>
+                <a:ext uri="{FF2B5EF4-FFF2-40B4-BE49-F238E27FC236}">
+                  <a16:creationId xmlns:a16="http://schemas.microsoft.com/office/drawing/2014/main" id="{B063A873-0C66-1FBA-187F-D4199B9824ED}"/>
+                </a:ext>
+              </a:extLst>
+            </p:cNvPr>
+            <p:cNvSpPr txBox="1"/>
+            <p:nvPr/>
+          </p:nvSpPr>
+          <p:spPr>
+            <a:xfrm>
+              <a:off x="9777953" y="3113905"/>
+              <a:ext cx="1420150" cy="369332"/>
+            </a:xfrm>
+            <a:prstGeom prst="rect">
+              <a:avLst/>
+            </a:prstGeom>
+            <a:noFill/>
+          </p:spPr>
+          <p:txBody>
+            <a:bodyPr wrap="square" rtlCol="0">
+              <a:spAutoFit/>
+            </a:bodyPr>
+            <a:lstStyle/>
+            <a:p>
+              <a:r>
+                <a:rPr lang="fr-FR" dirty="0">
+                  <a:solidFill>
+                    <a:schemeClr val="accent6"/>
+                  </a:solidFill>
+                </a:rPr>
+                <a:t>avant-arrière</a:t>
+              </a:r>
+            </a:p>
+          </p:txBody>
+        </p:sp>
+        <p:sp>
+          <p:nvSpPr>
+            <p:cNvPr id="17" name="ZoneTexte 16">
+              <a:extLst>
+                <a:ext uri="{FF2B5EF4-FFF2-40B4-BE49-F238E27FC236}">
+                  <a16:creationId xmlns:a16="http://schemas.microsoft.com/office/drawing/2014/main" id="{A95F19B3-9145-CFBA-AD50-ACE0B91EF80C}"/>
+                </a:ext>
+              </a:extLst>
+            </p:cNvPr>
+            <p:cNvSpPr txBox="1"/>
+            <p:nvPr/>
+          </p:nvSpPr>
+          <p:spPr>
+            <a:xfrm>
+              <a:off x="9357575" y="3298571"/>
+              <a:ext cx="487941" cy="369332"/>
+            </a:xfrm>
+            <a:prstGeom prst="rect">
+              <a:avLst/>
+            </a:prstGeom>
+            <a:noFill/>
+          </p:spPr>
+          <p:txBody>
+            <a:bodyPr wrap="square" rtlCol="0">
+              <a:spAutoFit/>
+            </a:bodyPr>
+            <a:lstStyle/>
+            <a:p>
+              <a:r>
+                <a:rPr lang="fr-FR" dirty="0">
+                  <a:solidFill>
+                    <a:schemeClr val="accent6"/>
+                  </a:solidFill>
+                </a:rPr>
+                <a:t>1</a:t>
+              </a:r>
+            </a:p>
+          </p:txBody>
+        </p:sp>
+        <p:sp>
+          <p:nvSpPr>
+            <p:cNvPr id="18" name="ZoneTexte 17">
+              <a:extLst>
+                <a:ext uri="{FF2B5EF4-FFF2-40B4-BE49-F238E27FC236}">
+                  <a16:creationId xmlns:a16="http://schemas.microsoft.com/office/drawing/2014/main" id="{0F84CEA8-611B-9077-5A21-C018C9399F4A}"/>
+                </a:ext>
+              </a:extLst>
+            </p:cNvPr>
+            <p:cNvSpPr txBox="1"/>
+            <p:nvPr/>
+          </p:nvSpPr>
+          <p:spPr>
+            <a:xfrm>
+              <a:off x="9268401" y="1675293"/>
+              <a:ext cx="462946" cy="369332"/>
+            </a:xfrm>
+            <a:prstGeom prst="rect">
+              <a:avLst/>
+            </a:prstGeom>
+            <a:noFill/>
+          </p:spPr>
+          <p:txBody>
+            <a:bodyPr wrap="square" rtlCol="0">
+              <a:spAutoFit/>
+            </a:bodyPr>
+            <a:lstStyle/>
+            <a:p>
+              <a:r>
+                <a:rPr lang="fr-FR" dirty="0">
+                  <a:solidFill>
+                    <a:schemeClr val="accent6"/>
+                  </a:solidFill>
+                </a:rPr>
+                <a:t>-1</a:t>
+              </a:r>
+            </a:p>
+          </p:txBody>
+        </p:sp>
+        <p:sp>
+          <p:nvSpPr>
+            <p:cNvPr id="22" name="ZoneTexte 21">
+              <a:extLst>
+                <a:ext uri="{FF2B5EF4-FFF2-40B4-BE49-F238E27FC236}">
+                  <a16:creationId xmlns:a16="http://schemas.microsoft.com/office/drawing/2014/main" id="{B2EDE50B-45D9-BAFB-B0DA-9AD17C8C4722}"/>
+                </a:ext>
+              </a:extLst>
+            </p:cNvPr>
+            <p:cNvSpPr txBox="1"/>
+            <p:nvPr/>
+          </p:nvSpPr>
+          <p:spPr>
+            <a:xfrm>
+              <a:off x="9912739" y="1715762"/>
+              <a:ext cx="487941" cy="369332"/>
+            </a:xfrm>
+            <a:prstGeom prst="rect">
+              <a:avLst/>
+            </a:prstGeom>
+            <a:noFill/>
+          </p:spPr>
+          <p:txBody>
+            <a:bodyPr wrap="square" rtlCol="0">
+              <a:spAutoFit/>
+            </a:bodyPr>
+            <a:lstStyle/>
+            <a:p>
+              <a:r>
+                <a:rPr lang="fr-FR" dirty="0">
+                  <a:solidFill>
+                    <a:schemeClr val="accent2"/>
+                  </a:solidFill>
+                </a:rPr>
+                <a:t>1</a:t>
+              </a:r>
+            </a:p>
+          </p:txBody>
+        </p:sp>
+        <p:sp>
+          <p:nvSpPr>
+            <p:cNvPr id="23" name="ZoneTexte 22">
+              <a:extLst>
+                <a:ext uri="{FF2B5EF4-FFF2-40B4-BE49-F238E27FC236}">
+                  <a16:creationId xmlns:a16="http://schemas.microsoft.com/office/drawing/2014/main" id="{D3B0933E-6E83-20BF-7655-10B8B417FFF8}"/>
+                </a:ext>
+              </a:extLst>
+            </p:cNvPr>
+            <p:cNvSpPr txBox="1"/>
+            <p:nvPr/>
+          </p:nvSpPr>
+          <p:spPr>
+            <a:xfrm>
+              <a:off x="8710362" y="1688017"/>
+              <a:ext cx="487941" cy="369332"/>
+            </a:xfrm>
+            <a:prstGeom prst="rect">
+              <a:avLst/>
+            </a:prstGeom>
+            <a:noFill/>
+          </p:spPr>
+          <p:txBody>
+            <a:bodyPr wrap="square" rtlCol="0">
+              <a:spAutoFit/>
+            </a:bodyPr>
+            <a:lstStyle/>
+            <a:p>
+              <a:r>
+                <a:rPr lang="fr-FR" dirty="0">
+                  <a:solidFill>
+                    <a:schemeClr val="accent2"/>
+                  </a:solidFill>
+                </a:rPr>
+                <a:t>-1</a:t>
+              </a:r>
+            </a:p>
+          </p:txBody>
+        </p:sp>
+        <p:sp>
+          <p:nvSpPr>
+            <p:cNvPr id="24" name="ZoneTexte 23">
+              <a:extLst>
+                <a:ext uri="{FF2B5EF4-FFF2-40B4-BE49-F238E27FC236}">
+                  <a16:creationId xmlns:a16="http://schemas.microsoft.com/office/drawing/2014/main" id="{AFCC136F-B63E-3809-C414-178F53CBCB05}"/>
+                </a:ext>
+              </a:extLst>
+            </p:cNvPr>
+            <p:cNvSpPr txBox="1"/>
+            <p:nvPr/>
+          </p:nvSpPr>
+          <p:spPr>
+            <a:xfrm>
+              <a:off x="10091197" y="1469486"/>
+              <a:ext cx="1986495" cy="369332"/>
+            </a:xfrm>
+            <a:prstGeom prst="rect">
+              <a:avLst/>
+            </a:prstGeom>
+            <a:noFill/>
+          </p:spPr>
+          <p:txBody>
+            <a:bodyPr wrap="square" rtlCol="0">
+              <a:spAutoFit/>
+            </a:bodyPr>
+            <a:lstStyle/>
+            <a:p>
+              <a:r>
+                <a:rPr lang="fr-FR" dirty="0">
+                  <a:solidFill>
+                    <a:schemeClr val="accent2"/>
+                  </a:solidFill>
+                </a:rPr>
+                <a:t>base gauche-droite</a:t>
+              </a:r>
+            </a:p>
+          </p:txBody>
+        </p:sp>
+      </p:grpSp>
+      <p:sp>
+        <p:nvSpPr>
+          <p:cNvPr id="20" name="Flèche : en arc 19">
+            <a:extLst>
+              <a:ext uri="{FF2B5EF4-FFF2-40B4-BE49-F238E27FC236}">
+                <a16:creationId xmlns:a16="http://schemas.microsoft.com/office/drawing/2014/main" id="{85EA4F32-1AEF-BBAD-1C50-6B725DFB5E00}"/>
+              </a:ext>
+            </a:extLst>
+          </p:cNvPr>
+          <p:cNvSpPr/>
+          <p:nvPr/>
+        </p:nvSpPr>
+        <p:spPr>
+          <a:xfrm>
+            <a:off x="8922655" y="1193153"/>
+            <a:ext cx="896486" cy="869459"/>
+          </a:xfrm>
+          <a:prstGeom prst="circularArrow">
+            <a:avLst>
+              <a:gd name="adj1" fmla="val 12500"/>
+              <a:gd name="adj2" fmla="val 1142319"/>
+              <a:gd name="adj3" fmla="val 20457681"/>
+              <a:gd name="adj4" fmla="val 16076382"/>
+              <a:gd name="adj5" fmla="val 12500"/>
+            </a:avLst>
+          </a:prstGeom>
+          <a:solidFill>
+            <a:schemeClr val="accent2"/>
+          </a:solidFill>
+          <a:ln>
+            <a:noFill/>
+          </a:ln>
+        </p:spPr>
+        <p:style>
+          <a:lnRef idx="2">
+            <a:schemeClr val="accent1">
+              <a:shade val="15000"/>
+            </a:schemeClr>
+          </a:lnRef>
+          <a:fillRef idx="1">
+            <a:schemeClr val="accent1"/>
+          </a:fillRef>
+          <a:effectRef idx="0">
+            <a:schemeClr val="accent1"/>
+          </a:effectRef>
+          <a:fontRef idx="minor">
+            <a:schemeClr val="lt1"/>
+          </a:fontRef>
+        </p:style>
+        <p:txBody>
+          <a:bodyPr rtlCol="0" anchor="ctr"/>
+          <a:lstStyle/>
+          <a:p>
+            <a:pPr algn="ctr"/>
+            <a:endParaRPr lang="fr-FR">
+              <a:solidFill>
+                <a:schemeClr val="tx1"/>
+              </a:solidFill>
+            </a:endParaRPr>
+          </a:p>
+        </p:txBody>
+      </p:sp>
+      <p:sp>
+        <p:nvSpPr>
+          <p:cNvPr id="21" name="Flèche : en arc 20">
+            <a:extLst>
+              <a:ext uri="{FF2B5EF4-FFF2-40B4-BE49-F238E27FC236}">
+                <a16:creationId xmlns:a16="http://schemas.microsoft.com/office/drawing/2014/main" id="{28262520-6EBE-EA05-8370-D73EEB04F673}"/>
+              </a:ext>
+            </a:extLst>
+          </p:cNvPr>
+          <p:cNvSpPr/>
+          <p:nvPr/>
+        </p:nvSpPr>
+        <p:spPr>
+          <a:xfrm flipH="1">
+            <a:off x="8474412" y="1193153"/>
+            <a:ext cx="896486" cy="869459"/>
+          </a:xfrm>
+          <a:prstGeom prst="circularArrow">
+            <a:avLst>
+              <a:gd name="adj1" fmla="val 12500"/>
+              <a:gd name="adj2" fmla="val 1142319"/>
+              <a:gd name="adj3" fmla="val 20457681"/>
+              <a:gd name="adj4" fmla="val 16076382"/>
+              <a:gd name="adj5" fmla="val 12500"/>
+            </a:avLst>
+          </a:prstGeom>
+          <a:solidFill>
+            <a:schemeClr val="accent2"/>
+          </a:solidFill>
+          <a:ln>
+            <a:noFill/>
+          </a:ln>
+        </p:spPr>
+        <p:style>
+          <a:lnRef idx="2">
+            <a:schemeClr val="accent1">
+              <a:shade val="15000"/>
+            </a:schemeClr>
+          </a:lnRef>
+          <a:fillRef idx="1">
+            <a:schemeClr val="accent1"/>
+          </a:fillRef>
+          <a:effectRef idx="0">
+            <a:schemeClr val="accent1"/>
+          </a:effectRef>
+          <a:fontRef idx="minor">
+            <a:schemeClr val="lt1"/>
+          </a:fontRef>
+        </p:style>
+        <p:txBody>
+          <a:bodyPr rtlCol="0" anchor="ctr"/>
+          <a:lstStyle/>
+          <a:p>
+            <a:pPr algn="ctr"/>
+            <a:endParaRPr lang="fr-FR">
+              <a:solidFill>
+                <a:schemeClr val="tx1"/>
+              </a:solidFill>
+            </a:endParaRPr>
+          </a:p>
+        </p:txBody>
+      </p:sp>
+      <p:sp>
+        <p:nvSpPr>
+          <p:cNvPr id="26" name="Flèche : double flèche horizontale 25">
+            <a:extLst>
+              <a:ext uri="{FF2B5EF4-FFF2-40B4-BE49-F238E27FC236}">
+                <a16:creationId xmlns:a16="http://schemas.microsoft.com/office/drawing/2014/main" id="{677BAB16-6158-E4AC-74F8-B97F6138D338}"/>
+              </a:ext>
+            </a:extLst>
+          </p:cNvPr>
+          <p:cNvSpPr/>
+          <p:nvPr/>
+        </p:nvSpPr>
+        <p:spPr>
+          <a:xfrm>
+            <a:off x="8531190" y="1861161"/>
+            <a:ext cx="1264614" cy="164715"/>
+          </a:xfrm>
+          <a:prstGeom prst="leftRightArrow">
+            <a:avLst/>
+          </a:prstGeom>
+          <a:solidFill>
+            <a:srgbClr val="FF0000"/>
+          </a:solidFill>
+          <a:ln>
+            <a:noFill/>
+          </a:ln>
+        </p:spPr>
+        <p:style>
+          <a:lnRef idx="2">
+            <a:schemeClr val="accent1">
+              <a:shade val="15000"/>
+            </a:schemeClr>
+          </a:lnRef>
+          <a:fillRef idx="1">
+            <a:schemeClr val="accent1"/>
+          </a:fillRef>
+          <a:effectRef idx="0">
+            <a:schemeClr val="accent1"/>
+          </a:effectRef>
+          <a:fontRef idx="minor">
+            <a:schemeClr val="lt1"/>
+          </a:fontRef>
+        </p:style>
+        <p:txBody>
+          <a:bodyPr rtlCol="0" anchor="ctr"/>
+          <a:lstStyle/>
+          <a:p>
+            <a:pPr algn="ctr"/>
+            <a:endParaRPr lang="fr-FR"/>
+          </a:p>
+        </p:txBody>
+      </p:sp>
+      <p:sp>
+        <p:nvSpPr>
+          <p:cNvPr id="27" name="Flèche : double flèche verticale 26">
+            <a:extLst>
+              <a:ext uri="{FF2B5EF4-FFF2-40B4-BE49-F238E27FC236}">
+                <a16:creationId xmlns:a16="http://schemas.microsoft.com/office/drawing/2014/main" id="{C85D4100-8BAA-899E-AC72-655A1C16D751}"/>
+              </a:ext>
+            </a:extLst>
+          </p:cNvPr>
+          <p:cNvSpPr/>
+          <p:nvPr/>
+        </p:nvSpPr>
+        <p:spPr>
+          <a:xfrm>
+            <a:off x="9070077" y="1326707"/>
+            <a:ext cx="145964" cy="1265835"/>
+          </a:xfrm>
+          <a:prstGeom prst="upDownArrow">
+            <a:avLst/>
+          </a:prstGeom>
+          <a:solidFill>
+            <a:schemeClr val="accent6"/>
+          </a:solidFill>
+          <a:ln>
+            <a:noFill/>
+          </a:ln>
+        </p:spPr>
+        <p:style>
+          <a:lnRef idx="2">
+            <a:schemeClr val="accent1">
+              <a:shade val="15000"/>
+            </a:schemeClr>
+          </a:lnRef>
+          <a:fillRef idx="1">
+            <a:schemeClr val="accent1"/>
+          </a:fillRef>
+          <a:effectRef idx="0">
+            <a:schemeClr val="accent1"/>
+          </a:effectRef>
+          <a:fontRef idx="minor">
+            <a:schemeClr val="lt1"/>
+          </a:fontRef>
+        </p:style>
+        <p:txBody>
+          <a:bodyPr rtlCol="0" anchor="ctr"/>
+          <a:lstStyle/>
+          <a:p>
+            <a:pPr algn="ctr"/>
+            <a:endParaRPr lang="fr-FR"/>
+          </a:p>
+        </p:txBody>
+      </p:sp>
+      <p:grpSp>
+        <p:nvGrpSpPr>
+          <p:cNvPr id="36" name="Groupe 35">
+            <a:extLst>
+              <a:ext uri="{FF2B5EF4-FFF2-40B4-BE49-F238E27FC236}">
+                <a16:creationId xmlns:a16="http://schemas.microsoft.com/office/drawing/2014/main" id="{3FB9F68B-848E-018C-F2F2-CA6DCD6E909D}"/>
+              </a:ext>
+            </a:extLst>
+          </p:cNvPr>
+          <p:cNvGrpSpPr/>
+          <p:nvPr/>
+        </p:nvGrpSpPr>
+        <p:grpSpPr>
+          <a:xfrm>
+            <a:off x="3855481" y="1881453"/>
+            <a:ext cx="4122820" cy="4634518"/>
+            <a:chOff x="4034590" y="1890880"/>
+            <a:chExt cx="4122820" cy="4634518"/>
+          </a:xfrm>
+        </p:grpSpPr>
+        <p:pic>
+          <p:nvPicPr>
+            <p:cNvPr id="5" name="Image 4" descr="Une image contenant texte, diagramme, conception&#10;&#10;Description générée automatiquement">
+              <a:extLst>
+                <a:ext uri="{FF2B5EF4-FFF2-40B4-BE49-F238E27FC236}">
+                  <a16:creationId xmlns:a16="http://schemas.microsoft.com/office/drawing/2014/main" id="{4C24D10C-22C3-FB07-5357-4B91FAAE414A}"/>
+                </a:ext>
+              </a:extLst>
+            </p:cNvPr>
+            <p:cNvPicPr>
+              <a:picLocks noChangeAspect="1"/>
+            </p:cNvPicPr>
+            <p:nvPr/>
+          </p:nvPicPr>
+          <p:blipFill rotWithShape="1">
+            <a:blip r:embed="rId2">
+              <a:extLst>
+                <a:ext uri="{28A0092B-C50C-407E-A947-70E740481C1C}">
+                  <a14:useLocalDpi xmlns:a14="http://schemas.microsoft.com/office/drawing/2010/main" val="0"/>
+                </a:ext>
+              </a:extLst>
+            </a:blip>
+            <a:srcRect l="30787" t="62924" r="48996"/>
+            <a:stretch/>
+          </p:blipFill>
+          <p:spPr>
+            <a:xfrm>
+              <a:off x="4034590" y="1890880"/>
+              <a:ext cx="4122820" cy="4634518"/>
+            </a:xfrm>
+            <a:prstGeom prst="rect">
+              <a:avLst/>
+            </a:prstGeom>
+          </p:spPr>
+        </p:pic>
+        <p:sp>
+          <p:nvSpPr>
+            <p:cNvPr id="2" name="ZoneTexte 1">
+              <a:extLst>
+                <a:ext uri="{FF2B5EF4-FFF2-40B4-BE49-F238E27FC236}">
+                  <a16:creationId xmlns:a16="http://schemas.microsoft.com/office/drawing/2014/main" id="{B5F209A9-9477-E345-E97C-93D3FF22B11E}"/>
+                </a:ext>
+              </a:extLst>
+            </p:cNvPr>
+            <p:cNvSpPr txBox="1"/>
+            <p:nvPr/>
+          </p:nvSpPr>
+          <p:spPr>
+            <a:xfrm>
+              <a:off x="6429800" y="2085094"/>
+              <a:ext cx="1281880" cy="369332"/>
+            </a:xfrm>
+            <a:prstGeom prst="rect">
+              <a:avLst/>
+            </a:prstGeom>
+            <a:noFill/>
+          </p:spPr>
+          <p:txBody>
+            <a:bodyPr wrap="square" rtlCol="0">
+              <a:spAutoFit/>
+            </a:bodyPr>
+            <a:lstStyle/>
+            <a:p>
+              <a:r>
+                <a:rPr lang="fr-FR" dirty="0"/>
+                <a:t>descendre</a:t>
+              </a:r>
+            </a:p>
+          </p:txBody>
+        </p:sp>
+        <p:sp>
+          <p:nvSpPr>
+            <p:cNvPr id="3" name="ZoneTexte 2">
+              <a:extLst>
+                <a:ext uri="{FF2B5EF4-FFF2-40B4-BE49-F238E27FC236}">
+                  <a16:creationId xmlns:a16="http://schemas.microsoft.com/office/drawing/2014/main" id="{32AD6C4F-07A1-389A-DC95-39E3D222A47A}"/>
+                </a:ext>
+              </a:extLst>
+            </p:cNvPr>
+            <p:cNvSpPr txBox="1"/>
+            <p:nvPr/>
+          </p:nvSpPr>
+          <p:spPr>
+            <a:xfrm>
+              <a:off x="5627388" y="4750267"/>
+              <a:ext cx="1106905" cy="369332"/>
+            </a:xfrm>
+            <a:prstGeom prst="rect">
+              <a:avLst/>
+            </a:prstGeom>
+            <a:noFill/>
+          </p:spPr>
+          <p:txBody>
+            <a:bodyPr wrap="square" rtlCol="0">
+              <a:spAutoFit/>
+            </a:bodyPr>
+            <a:lstStyle/>
+            <a:p>
+              <a:r>
+                <a:rPr lang="fr-FR" dirty="0"/>
+                <a:t>monter</a:t>
+              </a:r>
+            </a:p>
+          </p:txBody>
+        </p:sp>
+        <p:sp>
+          <p:nvSpPr>
+            <p:cNvPr id="6" name="ZoneTexte 5">
+              <a:extLst>
+                <a:ext uri="{FF2B5EF4-FFF2-40B4-BE49-F238E27FC236}">
+                  <a16:creationId xmlns:a16="http://schemas.microsoft.com/office/drawing/2014/main" id="{A88F7071-7898-EF15-EA7F-5D792F8A0653}"/>
+                </a:ext>
+              </a:extLst>
+            </p:cNvPr>
+            <p:cNvSpPr txBox="1"/>
+            <p:nvPr/>
+          </p:nvSpPr>
+          <p:spPr>
+            <a:xfrm>
+              <a:off x="6584677" y="2799419"/>
+              <a:ext cx="1414862" cy="338554"/>
+            </a:xfrm>
+            <a:prstGeom prst="rect">
+              <a:avLst/>
+            </a:prstGeom>
+            <a:noFill/>
+          </p:spPr>
+          <p:txBody>
+            <a:bodyPr wrap="square" rtlCol="0">
+              <a:spAutoFit/>
+            </a:bodyPr>
+            <a:lstStyle/>
+            <a:p>
+              <a:r>
+                <a:rPr lang="fr-FR" sz="1600" dirty="0"/>
+                <a:t>Poignet droite</a:t>
+              </a:r>
+            </a:p>
+          </p:txBody>
+        </p:sp>
+        <p:sp>
+          <p:nvSpPr>
+            <p:cNvPr id="7" name="ZoneTexte 6">
+              <a:extLst>
+                <a:ext uri="{FF2B5EF4-FFF2-40B4-BE49-F238E27FC236}">
+                  <a16:creationId xmlns:a16="http://schemas.microsoft.com/office/drawing/2014/main" id="{E38B139D-F272-F5F7-B53B-749950BF4F68}"/>
+                </a:ext>
+              </a:extLst>
+            </p:cNvPr>
+            <p:cNvSpPr txBox="1"/>
+            <p:nvPr/>
+          </p:nvSpPr>
+          <p:spPr>
+            <a:xfrm>
+              <a:off x="4150273" y="2812743"/>
+              <a:ext cx="1681813" cy="338554"/>
+            </a:xfrm>
+            <a:prstGeom prst="rect">
+              <a:avLst/>
+            </a:prstGeom>
+            <a:noFill/>
+          </p:spPr>
+          <p:txBody>
+            <a:bodyPr wrap="square" rtlCol="0">
+              <a:spAutoFit/>
+            </a:bodyPr>
+            <a:lstStyle/>
+            <a:p>
+              <a:r>
+                <a:rPr lang="fr-FR" sz="1600" dirty="0"/>
+                <a:t>Poignet gauche</a:t>
+              </a:r>
+            </a:p>
+          </p:txBody>
+        </p:sp>
+        <p:sp>
+          <p:nvSpPr>
+            <p:cNvPr id="30" name="Rectangle 29">
+              <a:extLst>
+                <a:ext uri="{FF2B5EF4-FFF2-40B4-BE49-F238E27FC236}">
+                  <a16:creationId xmlns:a16="http://schemas.microsoft.com/office/drawing/2014/main" id="{C6AB7844-D442-5512-21D4-1366B1964EF9}"/>
+                </a:ext>
+              </a:extLst>
+            </p:cNvPr>
+            <p:cNvSpPr/>
+            <p:nvPr/>
+          </p:nvSpPr>
+          <p:spPr>
+            <a:xfrm>
+              <a:off x="6580383" y="5632934"/>
+              <a:ext cx="1195136" cy="294640"/>
+            </a:xfrm>
+            <a:prstGeom prst="rect">
+              <a:avLst/>
+            </a:prstGeom>
+            <a:solidFill>
+              <a:srgbClr val="7030A0"/>
+            </a:solidFill>
+            <a:ln>
+              <a:noFill/>
+            </a:ln>
+          </p:spPr>
+          <p:style>
+            <a:lnRef idx="2">
+              <a:schemeClr val="accent1">
+                <a:shade val="15000"/>
+              </a:schemeClr>
+            </a:lnRef>
+            <a:fillRef idx="1">
+              <a:schemeClr val="accent1"/>
+            </a:fillRef>
+            <a:effectRef idx="0">
+              <a:schemeClr val="accent1"/>
+            </a:effectRef>
+            <a:fontRef idx="minor">
+              <a:schemeClr val="lt1"/>
+            </a:fontRef>
+          </p:style>
+          <p:txBody>
+            <a:bodyPr rtlCol="0" anchor="ctr"/>
+            <a:lstStyle/>
+            <a:p>
+              <a:pPr algn="ctr"/>
+              <a:endParaRPr lang="fr-FR" dirty="0"/>
+            </a:p>
+          </p:txBody>
+        </p:sp>
+      </p:grpSp>
+      <p:grpSp>
+        <p:nvGrpSpPr>
+          <p:cNvPr id="35" name="Groupe 34">
+            <a:extLst>
+              <a:ext uri="{FF2B5EF4-FFF2-40B4-BE49-F238E27FC236}">
+                <a16:creationId xmlns:a16="http://schemas.microsoft.com/office/drawing/2014/main" id="{1FE2976E-70A7-9E80-13FB-772FCC244AF2}"/>
+              </a:ext>
+            </a:extLst>
+          </p:cNvPr>
+          <p:cNvGrpSpPr/>
+          <p:nvPr/>
+        </p:nvGrpSpPr>
+        <p:grpSpPr>
+          <a:xfrm>
+            <a:off x="8093386" y="5062831"/>
+            <a:ext cx="2015181" cy="1472781"/>
+            <a:chOff x="8472768" y="5363918"/>
+            <a:chExt cx="2015181" cy="1472781"/>
+          </a:xfrm>
+        </p:grpSpPr>
+        <p:sp>
+          <p:nvSpPr>
+            <p:cNvPr id="29" name="Flèche : double flèche verticale 28">
+              <a:extLst>
+                <a:ext uri="{FF2B5EF4-FFF2-40B4-BE49-F238E27FC236}">
+                  <a16:creationId xmlns:a16="http://schemas.microsoft.com/office/drawing/2014/main" id="{1C88799A-8A62-91DC-9021-96A2FC11AB48}"/>
+                </a:ext>
+              </a:extLst>
+            </p:cNvPr>
+            <p:cNvSpPr/>
+            <p:nvPr/>
+          </p:nvSpPr>
+          <p:spPr>
+            <a:xfrm>
+              <a:off x="8533728" y="5699291"/>
+              <a:ext cx="176634" cy="808716"/>
+            </a:xfrm>
+            <a:prstGeom prst="upDownArrow">
+              <a:avLst/>
+            </a:prstGeom>
+            <a:solidFill>
+              <a:srgbClr val="7030A0"/>
+            </a:solidFill>
+            <a:ln>
+              <a:noFill/>
+            </a:ln>
+          </p:spPr>
+          <p:style>
+            <a:lnRef idx="2">
+              <a:schemeClr val="accent1">
+                <a:shade val="15000"/>
+              </a:schemeClr>
+            </a:lnRef>
+            <a:fillRef idx="1">
+              <a:schemeClr val="accent1"/>
+            </a:fillRef>
+            <a:effectRef idx="0">
+              <a:schemeClr val="accent1"/>
+            </a:effectRef>
+            <a:fontRef idx="minor">
+              <a:schemeClr val="lt1"/>
+            </a:fontRef>
+          </p:style>
+          <p:txBody>
+            <a:bodyPr rtlCol="0" anchor="ctr"/>
+            <a:lstStyle/>
+            <a:p>
+              <a:pPr algn="ctr"/>
+              <a:endParaRPr lang="fr-FR"/>
+            </a:p>
+          </p:txBody>
+        </p:sp>
+        <p:sp>
+          <p:nvSpPr>
+            <p:cNvPr id="32" name="ZoneTexte 31">
+              <a:extLst>
+                <a:ext uri="{FF2B5EF4-FFF2-40B4-BE49-F238E27FC236}">
+                  <a16:creationId xmlns:a16="http://schemas.microsoft.com/office/drawing/2014/main" id="{0291FA9A-A306-8A55-76D3-57828AEC200C}"/>
+                </a:ext>
+              </a:extLst>
+            </p:cNvPr>
+            <p:cNvSpPr txBox="1"/>
+            <p:nvPr/>
+          </p:nvSpPr>
+          <p:spPr>
+            <a:xfrm>
+              <a:off x="8472768" y="6467367"/>
+              <a:ext cx="291430" cy="369332"/>
+            </a:xfrm>
+            <a:prstGeom prst="rect">
+              <a:avLst/>
+            </a:prstGeom>
+            <a:noFill/>
+          </p:spPr>
+          <p:txBody>
+            <a:bodyPr wrap="square" rtlCol="0">
+              <a:spAutoFit/>
+            </a:bodyPr>
+            <a:lstStyle/>
+            <a:p>
+              <a:r>
+                <a:rPr lang="fr-FR" dirty="0">
+                  <a:solidFill>
+                    <a:srgbClr val="7030A0"/>
+                  </a:solidFill>
+                </a:rPr>
+                <a:t>1</a:t>
+              </a:r>
+            </a:p>
+          </p:txBody>
+        </p:sp>
+        <p:sp>
+          <p:nvSpPr>
+            <p:cNvPr id="33" name="ZoneTexte 32">
+              <a:extLst>
+                <a:ext uri="{FF2B5EF4-FFF2-40B4-BE49-F238E27FC236}">
+                  <a16:creationId xmlns:a16="http://schemas.microsoft.com/office/drawing/2014/main" id="{B00AF355-19A0-5DB8-DDCC-7C6442F179F0}"/>
+                </a:ext>
+              </a:extLst>
+            </p:cNvPr>
+            <p:cNvSpPr txBox="1"/>
+            <p:nvPr/>
+          </p:nvSpPr>
+          <p:spPr>
+            <a:xfrm>
+              <a:off x="8472768" y="5363918"/>
+              <a:ext cx="409168" cy="369332"/>
+            </a:xfrm>
+            <a:prstGeom prst="rect">
+              <a:avLst/>
+            </a:prstGeom>
+            <a:noFill/>
+          </p:spPr>
+          <p:txBody>
+            <a:bodyPr wrap="square" rtlCol="0">
+              <a:spAutoFit/>
+            </a:bodyPr>
+            <a:lstStyle/>
+            <a:p>
+              <a:r>
+                <a:rPr lang="fr-FR" dirty="0">
+                  <a:solidFill>
+                    <a:srgbClr val="7030A0"/>
+                  </a:solidFill>
+                </a:rPr>
+                <a:t>0</a:t>
+              </a:r>
+            </a:p>
+          </p:txBody>
+        </p:sp>
+        <p:sp>
+          <p:nvSpPr>
+            <p:cNvPr id="34" name="ZoneTexte 33">
+              <a:extLst>
+                <a:ext uri="{FF2B5EF4-FFF2-40B4-BE49-F238E27FC236}">
+                  <a16:creationId xmlns:a16="http://schemas.microsoft.com/office/drawing/2014/main" id="{EE72FC20-AE53-86F9-DE57-C918C12AC7EF}"/>
+                </a:ext>
+              </a:extLst>
+            </p:cNvPr>
+            <p:cNvSpPr txBox="1"/>
+            <p:nvPr/>
+          </p:nvSpPr>
+          <p:spPr>
+            <a:xfrm>
+              <a:off x="8738611" y="5883020"/>
+              <a:ext cx="1749338" cy="369332"/>
+            </a:xfrm>
+            <a:prstGeom prst="rect">
+              <a:avLst/>
+            </a:prstGeom>
+            <a:noFill/>
+          </p:spPr>
+          <p:txBody>
+            <a:bodyPr wrap="square" rtlCol="0">
+              <a:spAutoFit/>
+            </a:bodyPr>
+            <a:lstStyle/>
+            <a:p>
+              <a:r>
+                <a:rPr lang="fr-FR" dirty="0">
+                  <a:solidFill>
+                    <a:srgbClr val="7030A0"/>
+                  </a:solidFill>
+                </a:rPr>
+                <a:t>Ouverture pince</a:t>
+              </a:r>
+            </a:p>
+          </p:txBody>
+        </p:sp>
+      </p:grpSp>
+    </p:spTree>
+    <p:extLst>
+      <p:ext uri="{BB962C8B-B14F-4D97-AF65-F5344CB8AC3E}">
+        <p14:creationId xmlns:p14="http://schemas.microsoft.com/office/powerpoint/2010/main" val="4171302066"/>
+      </p:ext>
+    </p:extLst>
+  </p:cSld>
+  <p:clrMapOvr>
+    <a:masterClrMapping/>
+  </p:clrMapOvr>
+</p:sld>
+</file>
+
 <file path=ppt/theme/theme1.xml><?xml version="1.0" encoding="utf-8"?>
 <a:theme xmlns:a="http://schemas.openxmlformats.org/drawingml/2006/main" name="Thème Office">
   <a:themeElements>

</xml_diff>